<commit_message>
Remove old tex and pdf files, update workflow diagram with energy bootstrapping.
</commit_message>
<xml_diff>
--- a/analysis/workflow.pptx
+++ b/analysis/workflow.pptx
@@ -4,6 +4,9 @@
   <p:sldMasterIdLst>
     <p:sldMasterId id="2147483672" r:id="rId1"/>
   </p:sldMasterIdLst>
+  <p:notesMasterIdLst>
+    <p:notesMasterId r:id="rId3"/>
+  </p:notesMasterIdLst>
   <p:sldIdLst>
     <p:sldId id="256" r:id="rId2"/>
   </p:sldIdLst>
@@ -104,7 +107,445 @@
       </a:defRPr>
     </a:lvl9pPr>
   </p:defaultTextStyle>
+  <p:extLst>
+    <p:ext uri="{EFAFB233-063F-42B5-8137-9DF3F51BA10A}">
+      <p15:sldGuideLst xmlns:p15="http://schemas.microsoft.com/office/powerpoint/2012/main"/>
+    </p:ext>
+  </p:extLst>
 </p:presentation>
+</file>
+
+<file path=ppt/notesMasters/notesMaster1.xml><?xml version="1.0" encoding="utf-8"?>
+<p:notesMaster xmlns:a="http://schemas.openxmlformats.org/drawingml/2006/main" xmlns:r="http://schemas.openxmlformats.org/officeDocument/2006/relationships" xmlns:p="http://schemas.openxmlformats.org/presentationml/2006/main">
+  <p:cSld>
+    <p:bg>
+      <p:bgRef idx="1001">
+        <a:schemeClr val="bg1"/>
+      </p:bgRef>
+    </p:bg>
+    <p:spTree>
+      <p:nvGrpSpPr>
+        <p:cNvPr id="1" name=""/>
+        <p:cNvGrpSpPr/>
+        <p:nvPr/>
+      </p:nvGrpSpPr>
+      <p:grpSpPr>
+        <a:xfrm>
+          <a:off x="0" y="0"/>
+          <a:ext cx="0" cy="0"/>
+          <a:chOff x="0" y="0"/>
+          <a:chExt cx="0" cy="0"/>
+        </a:xfrm>
+      </p:grpSpPr>
+      <p:sp>
+        <p:nvSpPr>
+          <p:cNvPr id="2" name="Header Placeholder 1"/>
+          <p:cNvSpPr>
+            <a:spLocks noGrp="1"/>
+          </p:cNvSpPr>
+          <p:nvPr>
+            <p:ph type="hdr" sz="quarter"/>
+          </p:nvPr>
+        </p:nvSpPr>
+        <p:spPr>
+          <a:xfrm>
+            <a:off x="0" y="0"/>
+            <a:ext cx="2971800" cy="458788"/>
+          </a:xfrm>
+          <a:prstGeom prst="rect">
+            <a:avLst/>
+          </a:prstGeom>
+        </p:spPr>
+        <p:txBody>
+          <a:bodyPr vert="horz" lIns="91440" tIns="45720" rIns="91440" bIns="45720" rtlCol="0"/>
+          <a:lstStyle>
+            <a:lvl1pPr algn="l">
+              <a:defRPr sz="1200"/>
+            </a:lvl1pPr>
+          </a:lstStyle>
+          <a:p>
+            <a:endParaRPr lang="en-US"/>
+          </a:p>
+        </p:txBody>
+      </p:sp>
+      <p:sp>
+        <p:nvSpPr>
+          <p:cNvPr id="3" name="Date Placeholder 2"/>
+          <p:cNvSpPr>
+            <a:spLocks noGrp="1"/>
+          </p:cNvSpPr>
+          <p:nvPr>
+            <p:ph type="dt" idx="1"/>
+          </p:nvPr>
+        </p:nvSpPr>
+        <p:spPr>
+          <a:xfrm>
+            <a:off x="3884613" y="0"/>
+            <a:ext cx="2971800" cy="458788"/>
+          </a:xfrm>
+          <a:prstGeom prst="rect">
+            <a:avLst/>
+          </a:prstGeom>
+        </p:spPr>
+        <p:txBody>
+          <a:bodyPr vert="horz" lIns="91440" tIns="45720" rIns="91440" bIns="45720" rtlCol="0"/>
+          <a:lstStyle>
+            <a:lvl1pPr algn="r">
+              <a:defRPr sz="1200"/>
+            </a:lvl1pPr>
+          </a:lstStyle>
+          <a:p>
+            <a:fld id="{1BF040BE-FB3A-684E-8053-2F4289F520F7}" type="datetimeFigureOut">
+              <a:rPr lang="en-US" smtClean="0"/>
+              <a:t>5/23/19</a:t>
+            </a:fld>
+            <a:endParaRPr lang="en-US"/>
+          </a:p>
+        </p:txBody>
+      </p:sp>
+      <p:sp>
+        <p:nvSpPr>
+          <p:cNvPr id="4" name="Slide Image Placeholder 3"/>
+          <p:cNvSpPr>
+            <a:spLocks noGrp="1" noRot="1" noChangeAspect="1"/>
+          </p:cNvSpPr>
+          <p:nvPr>
+            <p:ph type="sldImg" idx="2"/>
+          </p:nvPr>
+        </p:nvSpPr>
+        <p:spPr>
+          <a:xfrm>
+            <a:off x="2657475" y="1143000"/>
+            <a:ext cx="1543050" cy="3086100"/>
+          </a:xfrm>
+          <a:prstGeom prst="rect">
+            <a:avLst/>
+          </a:prstGeom>
+          <a:noFill/>
+          <a:ln w="12700">
+            <a:solidFill>
+              <a:prstClr val="black"/>
+            </a:solidFill>
+          </a:ln>
+        </p:spPr>
+        <p:txBody>
+          <a:bodyPr vert="horz" lIns="91440" tIns="45720" rIns="91440" bIns="45720" rtlCol="0" anchor="ctr"/>
+          <a:lstStyle/>
+          <a:p>
+            <a:endParaRPr lang="en-US"/>
+          </a:p>
+        </p:txBody>
+      </p:sp>
+      <p:sp>
+        <p:nvSpPr>
+          <p:cNvPr id="5" name="Notes Placeholder 4"/>
+          <p:cNvSpPr>
+            <a:spLocks noGrp="1"/>
+          </p:cNvSpPr>
+          <p:nvPr>
+            <p:ph type="body" sz="quarter" idx="3"/>
+          </p:nvPr>
+        </p:nvSpPr>
+        <p:spPr>
+          <a:xfrm>
+            <a:off x="685800" y="4400550"/>
+            <a:ext cx="5486400" cy="3600450"/>
+          </a:xfrm>
+          <a:prstGeom prst="rect">
+            <a:avLst/>
+          </a:prstGeom>
+        </p:spPr>
+        <p:txBody>
+          <a:bodyPr vert="horz" lIns="91440" tIns="45720" rIns="91440" bIns="45720" rtlCol="0"/>
+          <a:lstStyle/>
+          <a:p>
+            <a:pPr lvl="0"/>
+            <a:r>
+              <a:rPr lang="en-US"/>
+              <a:t>Click to edit Master text styles</a:t>
+            </a:r>
+          </a:p>
+          <a:p>
+            <a:pPr lvl="1"/>
+            <a:r>
+              <a:rPr lang="en-US"/>
+              <a:t>Second level</a:t>
+            </a:r>
+          </a:p>
+          <a:p>
+            <a:pPr lvl="2"/>
+            <a:r>
+              <a:rPr lang="en-US"/>
+              <a:t>Third level</a:t>
+            </a:r>
+          </a:p>
+          <a:p>
+            <a:pPr lvl="3"/>
+            <a:r>
+              <a:rPr lang="en-US"/>
+              <a:t>Fourth level</a:t>
+            </a:r>
+          </a:p>
+          <a:p>
+            <a:pPr lvl="4"/>
+            <a:r>
+              <a:rPr lang="en-US"/>
+              <a:t>Fifth level</a:t>
+            </a:r>
+          </a:p>
+        </p:txBody>
+      </p:sp>
+      <p:sp>
+        <p:nvSpPr>
+          <p:cNvPr id="6" name="Footer Placeholder 5"/>
+          <p:cNvSpPr>
+            <a:spLocks noGrp="1"/>
+          </p:cNvSpPr>
+          <p:nvPr>
+            <p:ph type="ftr" sz="quarter" idx="4"/>
+          </p:nvPr>
+        </p:nvSpPr>
+        <p:spPr>
+          <a:xfrm>
+            <a:off x="0" y="8685213"/>
+            <a:ext cx="2971800" cy="458787"/>
+          </a:xfrm>
+          <a:prstGeom prst="rect">
+            <a:avLst/>
+          </a:prstGeom>
+        </p:spPr>
+        <p:txBody>
+          <a:bodyPr vert="horz" lIns="91440" tIns="45720" rIns="91440" bIns="45720" rtlCol="0" anchor="b"/>
+          <a:lstStyle>
+            <a:lvl1pPr algn="l">
+              <a:defRPr sz="1200"/>
+            </a:lvl1pPr>
+          </a:lstStyle>
+          <a:p>
+            <a:endParaRPr lang="en-US"/>
+          </a:p>
+        </p:txBody>
+      </p:sp>
+      <p:sp>
+        <p:nvSpPr>
+          <p:cNvPr id="7" name="Slide Number Placeholder 6"/>
+          <p:cNvSpPr>
+            <a:spLocks noGrp="1"/>
+          </p:cNvSpPr>
+          <p:nvPr>
+            <p:ph type="sldNum" sz="quarter" idx="5"/>
+          </p:nvPr>
+        </p:nvSpPr>
+        <p:spPr>
+          <a:xfrm>
+            <a:off x="3884613" y="8685213"/>
+            <a:ext cx="2971800" cy="458787"/>
+          </a:xfrm>
+          <a:prstGeom prst="rect">
+            <a:avLst/>
+          </a:prstGeom>
+        </p:spPr>
+        <p:txBody>
+          <a:bodyPr vert="horz" lIns="91440" tIns="45720" rIns="91440" bIns="45720" rtlCol="0" anchor="b"/>
+          <a:lstStyle>
+            <a:lvl1pPr algn="r">
+              <a:defRPr sz="1200"/>
+            </a:lvl1pPr>
+          </a:lstStyle>
+          <a:p>
+            <a:fld id="{2B066B28-445F-A84D-8E43-FFAAAA93DE04}" type="slidenum">
+              <a:rPr lang="en-US" smtClean="0"/>
+              <a:t>‹#›</a:t>
+            </a:fld>
+            <a:endParaRPr lang="en-US"/>
+          </a:p>
+        </p:txBody>
+      </p:sp>
+    </p:spTree>
+    <p:extLst>
+      <p:ext uri="{BB962C8B-B14F-4D97-AF65-F5344CB8AC3E}">
+        <p14:creationId xmlns:p14="http://schemas.microsoft.com/office/powerpoint/2010/main" val="2173469590"/>
+      </p:ext>
+    </p:extLst>
+  </p:cSld>
+  <p:clrMap bg1="lt1" tx1="dk1" bg2="lt2" tx2="dk2" accent1="accent1" accent2="accent2" accent3="accent3" accent4="accent4" accent5="accent5" accent6="accent6" hlink="hlink" folHlink="folHlink"/>
+  <p:notesStyle>
+    <a:lvl1pPr marL="0" algn="l" defTabSz="914400" rtl="0" eaLnBrk="1" latinLnBrk="0" hangingPunct="1">
+      <a:defRPr sz="1200" kern="1200">
+        <a:solidFill>
+          <a:schemeClr val="tx1"/>
+        </a:solidFill>
+        <a:latin typeface="+mn-lt"/>
+        <a:ea typeface="+mn-ea"/>
+        <a:cs typeface="+mn-cs"/>
+      </a:defRPr>
+    </a:lvl1pPr>
+    <a:lvl2pPr marL="457200" algn="l" defTabSz="914400" rtl="0" eaLnBrk="1" latinLnBrk="0" hangingPunct="1">
+      <a:defRPr sz="1200" kern="1200">
+        <a:solidFill>
+          <a:schemeClr val="tx1"/>
+        </a:solidFill>
+        <a:latin typeface="+mn-lt"/>
+        <a:ea typeface="+mn-ea"/>
+        <a:cs typeface="+mn-cs"/>
+      </a:defRPr>
+    </a:lvl2pPr>
+    <a:lvl3pPr marL="914400" algn="l" defTabSz="914400" rtl="0" eaLnBrk="1" latinLnBrk="0" hangingPunct="1">
+      <a:defRPr sz="1200" kern="1200">
+        <a:solidFill>
+          <a:schemeClr val="tx1"/>
+        </a:solidFill>
+        <a:latin typeface="+mn-lt"/>
+        <a:ea typeface="+mn-ea"/>
+        <a:cs typeface="+mn-cs"/>
+      </a:defRPr>
+    </a:lvl3pPr>
+    <a:lvl4pPr marL="1371600" algn="l" defTabSz="914400" rtl="0" eaLnBrk="1" latinLnBrk="0" hangingPunct="1">
+      <a:defRPr sz="1200" kern="1200">
+        <a:solidFill>
+          <a:schemeClr val="tx1"/>
+        </a:solidFill>
+        <a:latin typeface="+mn-lt"/>
+        <a:ea typeface="+mn-ea"/>
+        <a:cs typeface="+mn-cs"/>
+      </a:defRPr>
+    </a:lvl4pPr>
+    <a:lvl5pPr marL="1828800" algn="l" defTabSz="914400" rtl="0" eaLnBrk="1" latinLnBrk="0" hangingPunct="1">
+      <a:defRPr sz="1200" kern="1200">
+        <a:solidFill>
+          <a:schemeClr val="tx1"/>
+        </a:solidFill>
+        <a:latin typeface="+mn-lt"/>
+        <a:ea typeface="+mn-ea"/>
+        <a:cs typeface="+mn-cs"/>
+      </a:defRPr>
+    </a:lvl5pPr>
+    <a:lvl6pPr marL="2286000" algn="l" defTabSz="914400" rtl="0" eaLnBrk="1" latinLnBrk="0" hangingPunct="1">
+      <a:defRPr sz="1200" kern="1200">
+        <a:solidFill>
+          <a:schemeClr val="tx1"/>
+        </a:solidFill>
+        <a:latin typeface="+mn-lt"/>
+        <a:ea typeface="+mn-ea"/>
+        <a:cs typeface="+mn-cs"/>
+      </a:defRPr>
+    </a:lvl6pPr>
+    <a:lvl7pPr marL="2743200" algn="l" defTabSz="914400" rtl="0" eaLnBrk="1" latinLnBrk="0" hangingPunct="1">
+      <a:defRPr sz="1200" kern="1200">
+        <a:solidFill>
+          <a:schemeClr val="tx1"/>
+        </a:solidFill>
+        <a:latin typeface="+mn-lt"/>
+        <a:ea typeface="+mn-ea"/>
+        <a:cs typeface="+mn-cs"/>
+      </a:defRPr>
+    </a:lvl7pPr>
+    <a:lvl8pPr marL="3200400" algn="l" defTabSz="914400" rtl="0" eaLnBrk="1" latinLnBrk="0" hangingPunct="1">
+      <a:defRPr sz="1200" kern="1200">
+        <a:solidFill>
+          <a:schemeClr val="tx1"/>
+        </a:solidFill>
+        <a:latin typeface="+mn-lt"/>
+        <a:ea typeface="+mn-ea"/>
+        <a:cs typeface="+mn-cs"/>
+      </a:defRPr>
+    </a:lvl8pPr>
+    <a:lvl9pPr marL="3657600" algn="l" defTabSz="914400" rtl="0" eaLnBrk="1" latinLnBrk="0" hangingPunct="1">
+      <a:defRPr sz="1200" kern="1200">
+        <a:solidFill>
+          <a:schemeClr val="tx1"/>
+        </a:solidFill>
+        <a:latin typeface="+mn-lt"/>
+        <a:ea typeface="+mn-ea"/>
+        <a:cs typeface="+mn-cs"/>
+      </a:defRPr>
+    </a:lvl9pPr>
+  </p:notesStyle>
+</p:notesMaster>
+</file>
+
+<file path=ppt/notesSlides/notesSlide1.xml><?xml version="1.0" encoding="utf-8"?>
+<p:notes xmlns:a="http://schemas.openxmlformats.org/drawingml/2006/main" xmlns:r="http://schemas.openxmlformats.org/officeDocument/2006/relationships" xmlns:p="http://schemas.openxmlformats.org/presentationml/2006/main">
+  <p:cSld>
+    <p:spTree>
+      <p:nvGrpSpPr>
+        <p:cNvPr id="1" name=""/>
+        <p:cNvGrpSpPr/>
+        <p:nvPr/>
+      </p:nvGrpSpPr>
+      <p:grpSpPr>
+        <a:xfrm>
+          <a:off x="0" y="0"/>
+          <a:ext cx="0" cy="0"/>
+          <a:chOff x="0" y="0"/>
+          <a:chExt cx="0" cy="0"/>
+        </a:xfrm>
+      </p:grpSpPr>
+      <p:sp>
+        <p:nvSpPr>
+          <p:cNvPr id="2" name="Slide Image Placeholder 1"/>
+          <p:cNvSpPr>
+            <a:spLocks noGrp="1" noRot="1" noChangeAspect="1"/>
+          </p:cNvSpPr>
+          <p:nvPr>
+            <p:ph type="sldImg"/>
+          </p:nvPr>
+        </p:nvSpPr>
+        <p:spPr/>
+      </p:sp>
+      <p:sp>
+        <p:nvSpPr>
+          <p:cNvPr id="3" name="Notes Placeholder 2"/>
+          <p:cNvSpPr>
+            <a:spLocks noGrp="1"/>
+          </p:cNvSpPr>
+          <p:nvPr>
+            <p:ph type="body" idx="1"/>
+          </p:nvPr>
+        </p:nvSpPr>
+        <p:spPr/>
+        <p:txBody>
+          <a:bodyPr/>
+          <a:lstStyle/>
+          <a:p>
+            <a:endParaRPr lang="en-US"/>
+          </a:p>
+        </p:txBody>
+      </p:sp>
+      <p:sp>
+        <p:nvSpPr>
+          <p:cNvPr id="4" name="Slide Number Placeholder 3"/>
+          <p:cNvSpPr>
+            <a:spLocks noGrp="1"/>
+          </p:cNvSpPr>
+          <p:nvPr>
+            <p:ph type="sldNum" sz="quarter" idx="5"/>
+          </p:nvPr>
+        </p:nvSpPr>
+        <p:spPr/>
+        <p:txBody>
+          <a:bodyPr/>
+          <a:lstStyle/>
+          <a:p>
+            <a:fld id="{2B066B28-445F-A84D-8E43-FFAAAA93DE04}" type="slidenum">
+              <a:rPr lang="en-US" smtClean="0"/>
+              <a:t>1</a:t>
+            </a:fld>
+            <a:endParaRPr lang="en-US"/>
+          </a:p>
+        </p:txBody>
+      </p:sp>
+    </p:spTree>
+    <p:extLst>
+      <p:ext uri="{BB962C8B-B14F-4D97-AF65-F5344CB8AC3E}">
+        <p14:creationId xmlns:p14="http://schemas.microsoft.com/office/powerpoint/2010/main" val="3534315638"/>
+      </p:ext>
+    </p:extLst>
+  </p:cSld>
+  <p:clrMapOvr>
+    <a:masterClrMapping/>
+  </p:clrMapOvr>
+</p:notes>
 </file>
 
 <file path=ppt/slideLayouts/slideLayout1.xml><?xml version="1.0" encoding="utf-8"?>
@@ -238,7 +679,7 @@
           <a:p>
             <a:fld id="{E8FF4B53-4151-7245-9086-FCECC070EA2A}" type="datetimeFigureOut">
               <a:rPr lang="en-US" smtClean="0"/>
-              <a:t>5/22/19</a:t>
+              <a:t>5/23/19</a:t>
             </a:fld>
             <a:endParaRPr lang="en-US"/>
           </a:p>
@@ -408,7 +849,7 @@
           <a:p>
             <a:fld id="{E8FF4B53-4151-7245-9086-FCECC070EA2A}" type="datetimeFigureOut">
               <a:rPr lang="en-US" smtClean="0"/>
-              <a:t>5/22/19</a:t>
+              <a:t>5/23/19</a:t>
             </a:fld>
             <a:endParaRPr lang="en-US"/>
           </a:p>
@@ -588,7 +1029,7 @@
           <a:p>
             <a:fld id="{E8FF4B53-4151-7245-9086-FCECC070EA2A}" type="datetimeFigureOut">
               <a:rPr lang="en-US" smtClean="0"/>
-              <a:t>5/22/19</a:t>
+              <a:t>5/23/19</a:t>
             </a:fld>
             <a:endParaRPr lang="en-US"/>
           </a:p>
@@ -758,7 +1199,7 @@
           <a:p>
             <a:fld id="{E8FF4B53-4151-7245-9086-FCECC070EA2A}" type="datetimeFigureOut">
               <a:rPr lang="en-US" smtClean="0"/>
-              <a:t>5/22/19</a:t>
+              <a:t>5/23/19</a:t>
             </a:fld>
             <a:endParaRPr lang="en-US"/>
           </a:p>
@@ -1002,7 +1443,7 @@
           <a:p>
             <a:fld id="{E8FF4B53-4151-7245-9086-FCECC070EA2A}" type="datetimeFigureOut">
               <a:rPr lang="en-US" smtClean="0"/>
-              <a:t>5/22/19</a:t>
+              <a:t>5/23/19</a:t>
             </a:fld>
             <a:endParaRPr lang="en-US"/>
           </a:p>
@@ -1234,7 +1675,7 @@
           <a:p>
             <a:fld id="{E8FF4B53-4151-7245-9086-FCECC070EA2A}" type="datetimeFigureOut">
               <a:rPr lang="en-US" smtClean="0"/>
-              <a:t>5/22/19</a:t>
+              <a:t>5/23/19</a:t>
             </a:fld>
             <a:endParaRPr lang="en-US"/>
           </a:p>
@@ -1601,7 +2042,7 @@
           <a:p>
             <a:fld id="{E8FF4B53-4151-7245-9086-FCECC070EA2A}" type="datetimeFigureOut">
               <a:rPr lang="en-US" smtClean="0"/>
-              <a:t>5/22/19</a:t>
+              <a:t>5/23/19</a:t>
             </a:fld>
             <a:endParaRPr lang="en-US"/>
           </a:p>
@@ -1719,7 +2160,7 @@
           <a:p>
             <a:fld id="{E8FF4B53-4151-7245-9086-FCECC070EA2A}" type="datetimeFigureOut">
               <a:rPr lang="en-US" smtClean="0"/>
-              <a:t>5/22/19</a:t>
+              <a:t>5/23/19</a:t>
             </a:fld>
             <a:endParaRPr lang="en-US"/>
           </a:p>
@@ -1814,7 +2255,7 @@
           <a:p>
             <a:fld id="{E8FF4B53-4151-7245-9086-FCECC070EA2A}" type="datetimeFigureOut">
               <a:rPr lang="en-US" smtClean="0"/>
-              <a:t>5/22/19</a:t>
+              <a:t>5/23/19</a:t>
             </a:fld>
             <a:endParaRPr lang="en-US"/>
           </a:p>
@@ -2091,7 +2532,7 @@
           <a:p>
             <a:fld id="{E8FF4B53-4151-7245-9086-FCECC070EA2A}" type="datetimeFigureOut">
               <a:rPr lang="en-US" smtClean="0"/>
-              <a:t>5/22/19</a:t>
+              <a:t>5/23/19</a:t>
             </a:fld>
             <a:endParaRPr lang="en-US"/>
           </a:p>
@@ -2262,7 +2703,6 @@
               <a:rPr lang="en-US"/>
               <a:t>Click icon to add picture</a:t>
             </a:r>
-            <a:endParaRPr lang="en-US" dirty="0"/>
           </a:p>
         </p:txBody>
       </p:sp>
@@ -2348,7 +2788,7 @@
           <a:p>
             <a:fld id="{E8FF4B53-4151-7245-9086-FCECC070EA2A}" type="datetimeFigureOut">
               <a:rPr lang="en-US" smtClean="0"/>
-              <a:t>5/22/19</a:t>
+              <a:t>5/23/19</a:t>
             </a:fld>
             <a:endParaRPr lang="en-US"/>
           </a:p>
@@ -2561,7 +3001,7 @@
           <a:p>
             <a:fld id="{E8FF4B53-4151-7245-9086-FCECC070EA2A}" type="datetimeFigureOut">
               <a:rPr lang="en-US" smtClean="0"/>
-              <a:t>5/22/19</a:t>
+              <a:t>5/23/19</a:t>
             </a:fld>
             <a:endParaRPr lang="en-US"/>
           </a:p>
@@ -2980,8 +3420,8 @@
         </p:nvSpPr>
         <p:spPr>
           <a:xfrm>
-            <a:off x="-1605416" y="1354591"/>
-            <a:ext cx="3210832" cy="4832092"/>
+            <a:off x="-2850265" y="1353551"/>
+            <a:ext cx="3210832" cy="4401205"/>
           </a:xfrm>
           <a:prstGeom prst="rect">
             <a:avLst/>
@@ -3070,7 +3510,7 @@
             </a:r>
             <a:r>
               <a:rPr lang="en-US" sz="1400" dirty="0" err="1"/>
-              <a:t>energetic_dominance</a:t>
+              <a:t>extract_values_tsks</a:t>
             </a:r>
             <a:r>
               <a:rPr lang="en-US" sz="1400" dirty="0"/>
@@ -3084,7 +3524,7 @@
             </a:r>
             <a:r>
               <a:rPr lang="en-US" sz="1400" dirty="0" err="1"/>
-              <a:t>extract_values_tsks</a:t>
+              <a:t>extract_values_zarks</a:t>
             </a:r>
             <a:r>
               <a:rPr lang="en-US" sz="1400" dirty="0"/>
@@ -3098,7 +3538,7 @@
             </a:r>
             <a:r>
               <a:rPr lang="en-US" sz="1400" dirty="0" err="1"/>
-              <a:t>extract_values_zarks</a:t>
+              <a:t>find_modes</a:t>
             </a:r>
             <a:r>
               <a:rPr lang="en-US" sz="1400" dirty="0"/>
@@ -3112,7 +3552,7 @@
             </a:r>
             <a:r>
               <a:rPr lang="en-US" sz="1400" dirty="0" err="1"/>
-              <a:t>find_modes</a:t>
+              <a:t>find_ps</a:t>
             </a:r>
             <a:r>
               <a:rPr lang="en-US" sz="1400" dirty="0"/>
@@ -3126,7 +3566,7 @@
             </a:r>
             <a:r>
               <a:rPr lang="en-US" sz="1400" dirty="0" err="1"/>
-              <a:t>find_ps</a:t>
+              <a:t>get_bootstrap_p</a:t>
             </a:r>
             <a:r>
               <a:rPr lang="en-US" sz="1400" dirty="0"/>
@@ -3140,7 +3580,7 @@
             </a:r>
             <a:r>
               <a:rPr lang="en-US" sz="1400" dirty="0" err="1"/>
-              <a:t>get_bootstrap_p</a:t>
+              <a:t>ks_bsd</a:t>
             </a:r>
             <a:r>
               <a:rPr lang="en-US" sz="1400" dirty="0"/>
@@ -3154,7 +3594,7 @@
             </a:r>
             <a:r>
               <a:rPr lang="en-US" sz="1400" dirty="0" err="1"/>
-              <a:t>ks_bsd</a:t>
+              <a:t>make_community_table</a:t>
             </a:r>
             <a:r>
               <a:rPr lang="en-US" sz="1400" dirty="0"/>
@@ -3168,7 +3608,7 @@
             </a:r>
             <a:r>
               <a:rPr lang="en-US" sz="1400" dirty="0" err="1"/>
-              <a:t>make_community_table</a:t>
+              <a:t>plot_bootstrap_pvals</a:t>
             </a:r>
             <a:r>
               <a:rPr lang="en-US" sz="1400" dirty="0"/>
@@ -3182,7 +3622,7 @@
             </a:r>
             <a:r>
               <a:rPr lang="en-US" sz="1400" dirty="0" err="1"/>
-              <a:t>plot_bootstrap_pvals</a:t>
+              <a:t>plot_bsd</a:t>
             </a:r>
             <a:r>
               <a:rPr lang="en-US" sz="1400" dirty="0"/>
@@ -3196,7 +3636,7 @@
             </a:r>
             <a:r>
               <a:rPr lang="en-US" sz="1400" dirty="0" err="1"/>
-              <a:t>plot_bsd</a:t>
+              <a:t>plot_bsed_bootstrap_results</a:t>
             </a:r>
             <a:r>
               <a:rPr lang="en-US" sz="1400" dirty="0"/>
@@ -3210,7 +3650,7 @@
             </a:r>
             <a:r>
               <a:rPr lang="en-US" sz="1400" dirty="0" err="1"/>
-              <a:t>plot_bsed_bootstrap_results</a:t>
+              <a:t>plot_crosscomm_bseds</a:t>
             </a:r>
             <a:r>
               <a:rPr lang="en-US" sz="1400" dirty="0"/>
@@ -3224,35 +3664,7 @@
             </a:r>
             <a:r>
               <a:rPr lang="en-US" sz="1400" dirty="0" err="1"/>
-              <a:t>plot_crosscomm_bseds</a:t>
-            </a:r>
-            <a:r>
-              <a:rPr lang="en-US" sz="1400" dirty="0"/>
-              <a:t>)</a:t>
-            </a:r>
-          </a:p>
-          <a:p>
-            <a:r>
-              <a:rPr lang="en-US" sz="1400" dirty="0"/>
-              <a:t>export(</a:t>
-            </a:r>
-            <a:r>
-              <a:rPr lang="en-US" sz="1400" dirty="0" err="1"/>
               <a:t>plot_crosscomm_ks_pvals</a:t>
-            </a:r>
-            <a:r>
-              <a:rPr lang="en-US" sz="1400" dirty="0"/>
-              <a:t>)</a:t>
-            </a:r>
-          </a:p>
-          <a:p>
-            <a:r>
-              <a:rPr lang="en-US" sz="1400" dirty="0"/>
-              <a:t>export(</a:t>
-            </a:r>
-            <a:r>
-              <a:rPr lang="en-US" sz="1400" dirty="0" err="1"/>
-              <a:t>plot_e_dom</a:t>
             </a:r>
             <a:r>
               <a:rPr lang="en-US" sz="1400" dirty="0"/>
@@ -3317,7 +3729,7 @@
         </p:nvSpPr>
         <p:spPr>
           <a:xfrm>
-            <a:off x="1383459" y="1354592"/>
+            <a:off x="1496449" y="489004"/>
             <a:ext cx="3295839" cy="523220"/>
           </a:xfrm>
           <a:prstGeom prst="rect">
@@ -3345,33 +3757,33 @@
           <a:lstStyle/>
           <a:p>
             <a:r>
-              <a:rPr lang="en-US" sz="1400" dirty="0" err="1"/>
+              <a:rPr lang="en-US" sz="1400" err="1"/>
               <a:t>download_raw_paper_data</a:t>
             </a:r>
             <a:r>
-              <a:rPr lang="en-US" sz="1400" dirty="0"/>
+              <a:rPr lang="en-US" sz="1400"/>
               <a:t>(</a:t>
             </a:r>
             <a:r>
-              <a:rPr lang="en-US" sz="1400" dirty="0" err="1"/>
+              <a:rPr lang="en-US" sz="1400" err="1"/>
               <a:t>datapath</a:t>
             </a:r>
             <a:r>
-              <a:rPr lang="en-US" sz="1400" dirty="0"/>
+              <a:rPr lang="en-US" sz="1400"/>
               <a:t>)</a:t>
             </a:r>
           </a:p>
           <a:p>
             <a:r>
-              <a:rPr lang="en-US" sz="1400" i="1" dirty="0"/>
+              <a:rPr lang="en-US" sz="1400" i="1"/>
               <a:t>Save Ernest (2005) datasets to `</a:t>
             </a:r>
             <a:r>
-              <a:rPr lang="en-US" sz="1400" i="1" dirty="0" err="1"/>
+              <a:rPr lang="en-US" sz="1400" i="1" err="1"/>
               <a:t>datapath</a:t>
             </a:r>
             <a:r>
-              <a:rPr lang="en-US" sz="1400" i="1" dirty="0"/>
+              <a:rPr lang="en-US" sz="1400" i="1"/>
               <a:t>`. </a:t>
             </a:r>
           </a:p>
@@ -3391,7 +3803,7 @@
         </p:nvSpPr>
         <p:spPr>
           <a:xfrm>
-            <a:off x="2839437" y="2106203"/>
+            <a:off x="2840500" y="1485924"/>
             <a:ext cx="2252348" cy="523220"/>
           </a:xfrm>
           <a:prstGeom prst="rect">
@@ -3420,18 +3832,18 @@
           <a:p>
             <a:pPr algn="l"/>
             <a:r>
-              <a:rPr lang="en-US" sz="1400" dirty="0" err="1"/>
+              <a:rPr lang="en-US" sz="1400" err="1"/>
               <a:t>process_raw_data</a:t>
             </a:r>
             <a:r>
-              <a:rPr lang="en-US" sz="1400" dirty="0"/>
+              <a:rPr lang="en-US" sz="1400"/>
               <a:t>()</a:t>
             </a:r>
           </a:p>
           <a:p>
             <a:pPr algn="l"/>
             <a:r>
-              <a:rPr lang="en-US" sz="1400" i="1" dirty="0"/>
+              <a:rPr lang="en-US" sz="1400" i="1"/>
               <a:t>Clean and tidy raw datasets </a:t>
             </a:r>
           </a:p>
@@ -3451,7 +3863,7 @@
         </p:nvSpPr>
         <p:spPr>
           <a:xfrm>
-            <a:off x="754780" y="1935869"/>
+            <a:off x="732645" y="1270481"/>
             <a:ext cx="1865832" cy="954107"/>
           </a:xfrm>
           <a:prstGeom prst="rect">
@@ -3480,34 +3892,34 @@
           <a:p>
             <a:pPr algn="l"/>
             <a:r>
-              <a:rPr lang="en-US" sz="1400" dirty="0" err="1"/>
+              <a:rPr lang="en-US" sz="1400" err="1"/>
               <a:t>process_andrews_data</a:t>
             </a:r>
-            <a:endParaRPr lang="en-US" sz="1400" dirty="0"/>
+            <a:endParaRPr lang="en-US" sz="1400"/>
           </a:p>
           <a:p>
             <a:pPr algn="l"/>
             <a:r>
-              <a:rPr lang="en-US" sz="1400" dirty="0" err="1"/>
+              <a:rPr lang="en-US" sz="1400" err="1"/>
               <a:t>process_niwot_data</a:t>
             </a:r>
-            <a:endParaRPr lang="en-US" sz="1400" dirty="0"/>
+            <a:endParaRPr lang="en-US" sz="1400"/>
           </a:p>
           <a:p>
             <a:pPr algn="l"/>
             <a:r>
-              <a:rPr lang="en-US" sz="1400" dirty="0" err="1"/>
+              <a:rPr lang="en-US" sz="1400" err="1"/>
               <a:t>process_portal_data</a:t>
             </a:r>
-            <a:endParaRPr lang="en-US" sz="1400" dirty="0"/>
+            <a:endParaRPr lang="en-US" sz="1400"/>
           </a:p>
           <a:p>
             <a:pPr algn="l"/>
             <a:r>
-              <a:rPr lang="en-US" sz="1400" dirty="0" err="1"/>
+              <a:rPr lang="en-US" sz="1400" err="1"/>
               <a:t>process_sev_data</a:t>
             </a:r>
-            <a:endParaRPr lang="en-US" sz="1400" dirty="0"/>
+            <a:endParaRPr lang="en-US" sz="1400"/>
           </a:p>
         </p:txBody>
       </p:sp>
@@ -3529,8 +3941,8 @@
         </p:nvCxnSpPr>
         <p:spPr>
           <a:xfrm flipV="1">
-            <a:off x="2620613" y="2367814"/>
-            <a:ext cx="218825" cy="45109"/>
+            <a:off x="2598477" y="1747534"/>
+            <a:ext cx="242023" cy="1"/>
           </a:xfrm>
           <a:prstGeom prst="straightConnector1">
             <a:avLst/>
@@ -3597,18 +4009,18 @@
           <a:p>
             <a:pPr algn="l"/>
             <a:r>
-              <a:rPr lang="en-US" sz="1400" dirty="0" err="1"/>
+              <a:rPr lang="en-US" sz="1400" err="1"/>
               <a:t>load_paper_data</a:t>
             </a:r>
             <a:r>
-              <a:rPr lang="en-US" sz="1400" dirty="0"/>
+              <a:rPr lang="en-US" sz="1400"/>
               <a:t>()</a:t>
             </a:r>
           </a:p>
           <a:p>
             <a:pPr algn="l"/>
             <a:r>
-              <a:rPr lang="en-US" sz="1400" i="1" dirty="0"/>
+              <a:rPr lang="en-US" sz="1400" i="1"/>
               <a:t>load paper data</a:t>
             </a:r>
           </a:p>
@@ -3656,19 +4068,19 @@
           <a:lstStyle/>
           <a:p>
             <a:r>
-              <a:rPr lang="en-US" sz="1400" b="1" dirty="0"/>
+              <a:rPr lang="en-US" sz="1400" b="1"/>
               <a:t>communities</a:t>
             </a:r>
           </a:p>
           <a:p>
             <a:r>
-              <a:rPr lang="en-US" sz="1400" i="1" dirty="0"/>
+              <a:rPr lang="en-US" sz="1400" i="1"/>
               <a:t>list of 9 community tables</a:t>
             </a:r>
           </a:p>
           <a:p>
             <a:r>
-              <a:rPr lang="en-US" sz="1400" i="1" dirty="0"/>
+              <a:rPr lang="en-US" sz="1400" i="1"/>
               <a:t>`species id`, `weight (g)`</a:t>
             </a:r>
           </a:p>
@@ -3765,22 +4177,22 @@
           <a:p>
             <a:pPr algn="l"/>
             <a:r>
-              <a:rPr lang="en-US" sz="1400" b="1" dirty="0"/>
+              <a:rPr lang="en-US" sz="1400" b="1"/>
               <a:t> </a:t>
             </a:r>
             <a:r>
-              <a:rPr lang="en-US" sz="1400" dirty="0" err="1"/>
+              <a:rPr lang="en-US" sz="1400" err="1"/>
               <a:t>make_community_table</a:t>
             </a:r>
             <a:r>
-              <a:rPr lang="en-US" sz="1400" dirty="0"/>
+              <a:rPr lang="en-US" sz="1400"/>
               <a:t>(community)</a:t>
             </a:r>
           </a:p>
           <a:p>
             <a:pPr algn="l"/>
             <a:r>
-              <a:rPr lang="en-US" sz="1400" i="1" dirty="0"/>
+              <a:rPr lang="en-US" sz="1400" i="1"/>
               <a:t>calculate energy use + body size classes</a:t>
             </a:r>
           </a:p>
@@ -3877,22 +4289,22 @@
           <a:p>
             <a:pPr algn="l"/>
             <a:r>
-              <a:rPr lang="en-US" sz="1400" b="1" dirty="0" err="1"/>
+              <a:rPr lang="en-US" sz="1400" b="1" err="1"/>
               <a:t>communities_energy</a:t>
             </a:r>
-            <a:endParaRPr lang="en-US" sz="1400" dirty="0"/>
+            <a:endParaRPr lang="en-US" sz="1400"/>
           </a:p>
           <a:p>
             <a:pPr algn="l"/>
             <a:r>
-              <a:rPr lang="en-US" sz="1400" i="1" dirty="0"/>
+              <a:rPr lang="en-US" sz="1400" i="1"/>
               <a:t>list of 9 community tables with</a:t>
             </a:r>
           </a:p>
           <a:p>
             <a:pPr algn="l"/>
             <a:r>
-              <a:rPr lang="en-US" sz="1400" i="1" dirty="0"/>
+              <a:rPr lang="en-US" sz="1400" i="1"/>
               <a:t>energy and size class</a:t>
             </a:r>
           </a:p>
@@ -3989,26 +4401,26 @@
           <a:p>
             <a:pPr algn="l"/>
             <a:r>
-              <a:rPr lang="en-US" sz="1400" dirty="0" err="1"/>
+              <a:rPr lang="en-US" sz="1400" err="1"/>
               <a:t>make_bsed</a:t>
             </a:r>
             <a:r>
-              <a:rPr lang="en-US" sz="1400" dirty="0"/>
+              <a:rPr lang="en-US" sz="1400"/>
               <a:t>(</a:t>
             </a:r>
             <a:r>
-              <a:rPr lang="en-US" sz="1400" dirty="0" err="1"/>
+              <a:rPr lang="en-US" sz="1400" err="1"/>
               <a:t>community_energy</a:t>
             </a:r>
             <a:r>
-              <a:rPr lang="en-US" sz="1400" dirty="0"/>
+              <a:rPr lang="en-US" sz="1400"/>
               <a:t>)</a:t>
             </a:r>
           </a:p>
           <a:p>
             <a:pPr algn="l"/>
             <a:r>
-              <a:rPr lang="en-US" sz="1400" i="1" dirty="0"/>
+              <a:rPr lang="en-US" sz="1400" i="1"/>
               <a:t>make body size energy use table</a:t>
             </a:r>
           </a:p>
@@ -4057,10 +4469,10 @@
           <a:p>
             <a:pPr algn="l"/>
             <a:r>
-              <a:rPr lang="en-US" sz="1400" b="1" dirty="0" err="1"/>
+              <a:rPr lang="en-US" sz="1400" b="1" err="1"/>
               <a:t>bseds</a:t>
             </a:r>
-            <a:endParaRPr lang="en-US" sz="1400" b="1" dirty="0"/>
+            <a:endParaRPr lang="en-US" sz="1400" b="1"/>
           </a:p>
         </p:txBody>
       </p:sp>
@@ -4174,7 +4586,7 @@
         </p:nvSpPr>
         <p:spPr>
           <a:xfrm>
-            <a:off x="10423211" y="4887525"/>
+            <a:off x="10423211" y="5249716"/>
             <a:ext cx="1420197" cy="307777"/>
           </a:xfrm>
           <a:prstGeom prst="rect">
@@ -4203,10 +4615,10 @@
           <a:p>
             <a:pPr algn="l"/>
             <a:r>
-              <a:rPr lang="en-US" sz="1400" dirty="0" err="1"/>
+              <a:rPr lang="en-US" sz="1400" err="1"/>
               <a:t>plot_paper_dists</a:t>
             </a:r>
-            <a:endParaRPr lang="en-US" sz="1400" dirty="0"/>
+            <a:endParaRPr lang="en-US" sz="1400"/>
           </a:p>
         </p:txBody>
       </p:sp>
@@ -4253,10 +4665,10 @@
           <a:p>
             <a:pPr algn="l"/>
             <a:r>
-              <a:rPr lang="en-US" sz="1400" b="1" dirty="0" err="1"/>
+              <a:rPr lang="en-US" sz="1400" b="1" err="1"/>
               <a:t>bseds_plot</a:t>
             </a:r>
-            <a:endParaRPr lang="en-US" sz="1400" b="1" dirty="0"/>
+            <a:endParaRPr lang="en-US" sz="1400" b="1"/>
           </a:p>
         </p:txBody>
       </p:sp>
@@ -4270,6 +4682,7 @@
             </a:extLst>
           </p:cNvPr>
           <p:cNvCxnSpPr>
+            <a:cxnSpLocks/>
             <a:stCxn id="34" idx="3"/>
             <a:endCxn id="40" idx="0"/>
           </p:cNvCxnSpPr>
@@ -4278,7 +4691,7 @@
         <p:spPr>
           <a:xfrm>
             <a:off x="8352356" y="4537695"/>
-            <a:ext cx="2780954" cy="349830"/>
+            <a:ext cx="2780954" cy="712021"/>
           </a:xfrm>
           <a:prstGeom prst="straightConnector1">
             <a:avLst/>
@@ -4318,6 +4731,7 @@
             </a:extLst>
           </p:cNvPr>
           <p:cNvCxnSpPr>
+            <a:cxnSpLocks/>
             <a:stCxn id="40" idx="0"/>
             <a:endCxn id="41" idx="1"/>
           </p:cNvCxnSpPr>
@@ -4326,7 +4740,7 @@
         <p:spPr>
           <a:xfrm flipV="1">
             <a:off x="11133310" y="4504878"/>
-            <a:ext cx="1745955" cy="382647"/>
+            <a:ext cx="1745955" cy="744838"/>
           </a:xfrm>
           <a:prstGeom prst="straightConnector1">
             <a:avLst/>
@@ -4370,7 +4784,7 @@
         </p:nvSpPr>
         <p:spPr>
           <a:xfrm>
-            <a:off x="2873829" y="4855029"/>
+            <a:off x="1725706" y="5132405"/>
             <a:ext cx="2455159" cy="523220"/>
           </a:xfrm>
           <a:prstGeom prst="rect">
@@ -4399,26 +4813,26 @@
           <a:p>
             <a:pPr algn="l"/>
             <a:r>
-              <a:rPr lang="en-US" sz="1400" dirty="0" err="1"/>
+              <a:rPr lang="en-US" sz="1400" err="1"/>
               <a:t>make_bsd</a:t>
             </a:r>
             <a:r>
-              <a:rPr lang="en-US" sz="1400" dirty="0"/>
+              <a:rPr lang="en-US" sz="1400"/>
               <a:t>(</a:t>
             </a:r>
             <a:r>
-              <a:rPr lang="en-US" sz="1400" dirty="0" err="1"/>
+              <a:rPr lang="en-US" sz="1400" err="1"/>
               <a:t>community_energy</a:t>
             </a:r>
             <a:r>
-              <a:rPr lang="en-US" sz="1400" dirty="0"/>
+              <a:rPr lang="en-US" sz="1400"/>
               <a:t>)</a:t>
             </a:r>
           </a:p>
           <a:p>
             <a:pPr algn="l"/>
             <a:r>
-              <a:rPr lang="en-US" sz="1400" i="1" dirty="0"/>
+              <a:rPr lang="en-US" sz="1400" i="1"/>
               <a:t>make species body size table</a:t>
             </a:r>
           </a:p>
@@ -4438,7 +4852,7 @@
         </p:nvSpPr>
         <p:spPr>
           <a:xfrm>
-            <a:off x="7815943" y="4985657"/>
+            <a:off x="7750082" y="5355339"/>
             <a:ext cx="520399" cy="307777"/>
           </a:xfrm>
           <a:prstGeom prst="rect">
@@ -4467,10 +4881,10 @@
           <a:p>
             <a:pPr algn="l"/>
             <a:r>
-              <a:rPr lang="en-US" sz="1400" b="1" dirty="0" err="1"/>
+              <a:rPr lang="en-US" sz="1400" b="1" err="1"/>
               <a:t>bsds</a:t>
             </a:r>
-            <a:endParaRPr lang="en-US" sz="1400" b="1" dirty="0"/>
+            <a:endParaRPr lang="en-US" sz="1400" b="1"/>
           </a:p>
         </p:txBody>
       </p:sp>
@@ -4491,8 +4905,8 @@
         </p:nvCxnSpPr>
         <p:spPr>
           <a:xfrm>
-            <a:off x="5328988" y="5116639"/>
-            <a:ext cx="2486955" cy="22907"/>
+            <a:off x="4180865" y="5394015"/>
+            <a:ext cx="3569217" cy="115213"/>
           </a:xfrm>
           <a:prstGeom prst="straightConnector1">
             <a:avLst/>
@@ -4539,8 +4953,8 @@
         </p:nvCxnSpPr>
         <p:spPr>
           <a:xfrm flipV="1">
-            <a:off x="8336342" y="5041414"/>
-            <a:ext cx="2086869" cy="98132"/>
+            <a:off x="8270481" y="5403605"/>
+            <a:ext cx="2152730" cy="105623"/>
           </a:xfrm>
           <a:prstGeom prst="straightConnector1">
             <a:avLst/>
@@ -4584,7 +4998,7 @@
         </p:nvSpPr>
         <p:spPr>
           <a:xfrm>
-            <a:off x="12879265" y="4887525"/>
+            <a:off x="12879265" y="5249716"/>
             <a:ext cx="909929" cy="307777"/>
           </a:xfrm>
           <a:prstGeom prst="rect">
@@ -4613,10 +5027,10 @@
           <a:p>
             <a:pPr algn="l"/>
             <a:r>
-              <a:rPr lang="en-US" sz="1400" b="1" dirty="0" err="1"/>
+              <a:rPr lang="en-US" sz="1400" b="1" err="1"/>
               <a:t>bsds_plot</a:t>
             </a:r>
-            <a:endParaRPr lang="en-US" sz="1400" b="1" dirty="0"/>
+            <a:endParaRPr lang="en-US" sz="1400" b="1"/>
           </a:p>
         </p:txBody>
       </p:sp>
@@ -4637,8 +5051,3066 @@
         </p:nvCxnSpPr>
         <p:spPr>
           <a:xfrm>
-            <a:off x="11843408" y="5041414"/>
+            <a:off x="11843408" y="5403605"/>
             <a:ext cx="1035857" cy="0"/>
+          </a:xfrm>
+          <a:prstGeom prst="straightConnector1">
+            <a:avLst/>
+          </a:prstGeom>
+          <a:ln w="9525" cap="flat" cmpd="sng" algn="ctr">
+            <a:solidFill>
+              <a:schemeClr val="dk1"/>
+            </a:solidFill>
+            <a:prstDash val="solid"/>
+            <a:round/>
+            <a:headEnd type="none" w="med" len="med"/>
+            <a:tailEnd type="triangle"/>
+          </a:ln>
+        </p:spPr>
+        <p:style>
+          <a:lnRef idx="0">
+            <a:scrgbClr r="0" g="0" b="0"/>
+          </a:lnRef>
+          <a:fillRef idx="0">
+            <a:scrgbClr r="0" g="0" b="0"/>
+          </a:fillRef>
+          <a:effectRef idx="0">
+            <a:scrgbClr r="0" g="0" b="0"/>
+          </a:effectRef>
+          <a:fontRef idx="minor">
+            <a:schemeClr val="tx1"/>
+          </a:fontRef>
+        </p:style>
+      </p:cxnSp>
+      <p:sp>
+        <p:nvSpPr>
+          <p:cNvPr id="2" name="TextBox 1">
+            <a:extLst>
+              <a:ext uri="{FF2B5EF4-FFF2-40B4-BE49-F238E27FC236}">
+                <a16:creationId xmlns:a16="http://schemas.microsoft.com/office/drawing/2014/main" id="{BF011F70-7042-9A43-9CC3-18EFEF46E39D}"/>
+              </a:ext>
+            </a:extLst>
+          </p:cNvPr>
+          <p:cNvSpPr txBox="1"/>
+          <p:nvPr/>
+        </p:nvSpPr>
+        <p:spPr>
+          <a:xfrm>
+            <a:off x="3012818" y="6337457"/>
+            <a:ext cx="3300134" cy="523220"/>
+          </a:xfrm>
+          <a:prstGeom prst="rect">
+            <a:avLst/>
+          </a:prstGeom>
+        </p:spPr>
+        <p:style>
+          <a:lnRef idx="2">
+            <a:schemeClr val="dk1"/>
+          </a:lnRef>
+          <a:fillRef idx="1">
+            <a:schemeClr val="lt1"/>
+          </a:fillRef>
+          <a:effectRef idx="0">
+            <a:schemeClr val="dk1"/>
+          </a:effectRef>
+          <a:fontRef idx="minor">
+            <a:schemeClr val="dk1"/>
+          </a:fontRef>
+        </p:style>
+        <p:txBody>
+          <a:bodyPr wrap="none" rtlCol="0">
+            <a:spAutoFit/>
+          </a:bodyPr>
+          <a:lstStyle/>
+          <a:p>
+            <a:pPr algn="l"/>
+            <a:r>
+              <a:rPr lang="en-US" sz="1400" err="1"/>
+              <a:t>energetic_dominance</a:t>
+            </a:r>
+            <a:r>
+              <a:rPr lang="en-US" sz="1400"/>
+              <a:t>(</a:t>
+            </a:r>
+            <a:r>
+              <a:rPr lang="en-US" sz="1400" err="1"/>
+              <a:t>community_energy</a:t>
+            </a:r>
+            <a:r>
+              <a:rPr lang="en-US" sz="1400"/>
+              <a:t>)</a:t>
+            </a:r>
+          </a:p>
+          <a:p>
+            <a:pPr algn="l"/>
+            <a:r>
+              <a:rPr lang="en-US" sz="1400" i="1"/>
+              <a:t>calculate energetic dominance values</a:t>
+            </a:r>
+          </a:p>
+        </p:txBody>
+      </p:sp>
+      <p:cxnSp>
+        <p:nvCxnSpPr>
+          <p:cNvPr id="11" name="Straight Arrow Connector 10">
+            <a:extLst>
+              <a:ext uri="{FF2B5EF4-FFF2-40B4-BE49-F238E27FC236}">
+                <a16:creationId xmlns:a16="http://schemas.microsoft.com/office/drawing/2014/main" id="{830B8AD4-2501-EB4B-845E-24818EFB683D}"/>
+              </a:ext>
+            </a:extLst>
+          </p:cNvPr>
+          <p:cNvCxnSpPr>
+            <a:stCxn id="30" idx="1"/>
+            <a:endCxn id="48" idx="3"/>
+          </p:cNvCxnSpPr>
+          <p:nvPr/>
+        </p:nvCxnSpPr>
+        <p:spPr>
+          <a:xfrm flipH="1">
+            <a:off x="4180865" y="3766083"/>
+            <a:ext cx="3561324" cy="1627932"/>
+          </a:xfrm>
+          <a:prstGeom prst="straightConnector1">
+            <a:avLst/>
+          </a:prstGeom>
+          <a:ln w="9525" cap="flat" cmpd="sng" algn="ctr">
+            <a:solidFill>
+              <a:schemeClr val="dk1"/>
+            </a:solidFill>
+            <a:prstDash val="solid"/>
+            <a:round/>
+            <a:headEnd type="none" w="med" len="med"/>
+            <a:tailEnd type="triangle"/>
+          </a:ln>
+        </p:spPr>
+        <p:style>
+          <a:lnRef idx="0">
+            <a:scrgbClr r="0" g="0" b="0"/>
+          </a:lnRef>
+          <a:fillRef idx="0">
+            <a:scrgbClr r="0" g="0" b="0"/>
+          </a:fillRef>
+          <a:effectRef idx="0">
+            <a:scrgbClr r="0" g="0" b="0"/>
+          </a:effectRef>
+          <a:fontRef idx="minor">
+            <a:schemeClr val="tx1"/>
+          </a:fontRef>
+        </p:style>
+      </p:cxnSp>
+      <p:cxnSp>
+        <p:nvCxnSpPr>
+          <p:cNvPr id="14" name="Straight Arrow Connector 13">
+            <a:extLst>
+              <a:ext uri="{FF2B5EF4-FFF2-40B4-BE49-F238E27FC236}">
+                <a16:creationId xmlns:a16="http://schemas.microsoft.com/office/drawing/2014/main" id="{24D0B9E2-4440-4C4E-A137-9F5EAF9AF364}"/>
+              </a:ext>
+            </a:extLst>
+          </p:cNvPr>
+          <p:cNvCxnSpPr>
+            <a:stCxn id="30" idx="1"/>
+            <a:endCxn id="2" idx="0"/>
+          </p:cNvCxnSpPr>
+          <p:nvPr/>
+        </p:nvCxnSpPr>
+        <p:spPr>
+          <a:xfrm flipH="1">
+            <a:off x="4662885" y="3766083"/>
+            <a:ext cx="3079304" cy="2571374"/>
+          </a:xfrm>
+          <a:prstGeom prst="straightConnector1">
+            <a:avLst/>
+          </a:prstGeom>
+          <a:ln w="9525" cap="flat" cmpd="sng" algn="ctr">
+            <a:solidFill>
+              <a:schemeClr val="dk1"/>
+            </a:solidFill>
+            <a:prstDash val="solid"/>
+            <a:round/>
+            <a:headEnd type="none" w="med" len="med"/>
+            <a:tailEnd type="triangle"/>
+          </a:ln>
+        </p:spPr>
+        <p:style>
+          <a:lnRef idx="0">
+            <a:scrgbClr r="0" g="0" b="0"/>
+          </a:lnRef>
+          <a:fillRef idx="0">
+            <a:scrgbClr r="0" g="0" b="0"/>
+          </a:fillRef>
+          <a:effectRef idx="0">
+            <a:scrgbClr r="0" g="0" b="0"/>
+          </a:effectRef>
+          <a:fontRef idx="minor">
+            <a:schemeClr val="tx1"/>
+          </a:fontRef>
+        </p:style>
+      </p:cxnSp>
+      <p:sp>
+        <p:nvSpPr>
+          <p:cNvPr id="18" name="TextBox 17">
+            <a:extLst>
+              <a:ext uri="{FF2B5EF4-FFF2-40B4-BE49-F238E27FC236}">
+                <a16:creationId xmlns:a16="http://schemas.microsoft.com/office/drawing/2014/main" id="{BB0007D8-DC4F-7949-99DE-E00E31BA1C28}"/>
+              </a:ext>
+            </a:extLst>
+          </p:cNvPr>
+          <p:cNvSpPr txBox="1"/>
+          <p:nvPr/>
+        </p:nvSpPr>
+        <p:spPr>
+          <a:xfrm>
+            <a:off x="7720354" y="6430633"/>
+            <a:ext cx="1304716" cy="307777"/>
+          </a:xfrm>
+          <a:prstGeom prst="rect">
+            <a:avLst/>
+          </a:prstGeom>
+        </p:spPr>
+        <p:style>
+          <a:lnRef idx="2">
+            <a:schemeClr val="accent2"/>
+          </a:lnRef>
+          <a:fillRef idx="1">
+            <a:schemeClr val="lt1"/>
+          </a:fillRef>
+          <a:effectRef idx="0">
+            <a:schemeClr val="accent2"/>
+          </a:effectRef>
+          <a:fontRef idx="minor">
+            <a:schemeClr val="dk1"/>
+          </a:fontRef>
+        </p:style>
+        <p:txBody>
+          <a:bodyPr wrap="none" rtlCol="0">
+            <a:spAutoFit/>
+          </a:bodyPr>
+          <a:lstStyle/>
+          <a:p>
+            <a:pPr algn="l"/>
+            <a:r>
+              <a:rPr lang="en-US" sz="1400" b="1" err="1"/>
+              <a:t>energetic_dom</a:t>
+            </a:r>
+            <a:endParaRPr lang="en-US" sz="1400" b="1"/>
+          </a:p>
+        </p:txBody>
+      </p:sp>
+      <p:cxnSp>
+        <p:nvCxnSpPr>
+          <p:cNvPr id="22" name="Straight Arrow Connector 21">
+            <a:extLst>
+              <a:ext uri="{FF2B5EF4-FFF2-40B4-BE49-F238E27FC236}">
+                <a16:creationId xmlns:a16="http://schemas.microsoft.com/office/drawing/2014/main" id="{DBBB385D-1EC6-2042-9493-3377D8101BE5}"/>
+              </a:ext>
+            </a:extLst>
+          </p:cNvPr>
+          <p:cNvCxnSpPr>
+            <a:stCxn id="2" idx="3"/>
+            <a:endCxn id="18" idx="1"/>
+          </p:cNvCxnSpPr>
+          <p:nvPr/>
+        </p:nvCxnSpPr>
+        <p:spPr>
+          <a:xfrm flipV="1">
+            <a:off x="6312952" y="6584522"/>
+            <a:ext cx="1407402" cy="14545"/>
+          </a:xfrm>
+          <a:prstGeom prst="straightConnector1">
+            <a:avLst/>
+          </a:prstGeom>
+          <a:ln w="9525" cap="flat" cmpd="sng" algn="ctr">
+            <a:solidFill>
+              <a:schemeClr val="dk1"/>
+            </a:solidFill>
+            <a:prstDash val="solid"/>
+            <a:round/>
+            <a:headEnd type="none" w="med" len="med"/>
+            <a:tailEnd type="triangle"/>
+          </a:ln>
+        </p:spPr>
+        <p:style>
+          <a:lnRef idx="0">
+            <a:scrgbClr r="0" g="0" b="0"/>
+          </a:lnRef>
+          <a:fillRef idx="0">
+            <a:scrgbClr r="0" g="0" b="0"/>
+          </a:fillRef>
+          <a:effectRef idx="0">
+            <a:scrgbClr r="0" g="0" b="0"/>
+          </a:effectRef>
+          <a:fontRef idx="minor">
+            <a:schemeClr val="tx1"/>
+          </a:fontRef>
+        </p:style>
+      </p:cxnSp>
+      <p:sp>
+        <p:nvSpPr>
+          <p:cNvPr id="25" name="TextBox 24">
+            <a:extLst>
+              <a:ext uri="{FF2B5EF4-FFF2-40B4-BE49-F238E27FC236}">
+                <a16:creationId xmlns:a16="http://schemas.microsoft.com/office/drawing/2014/main" id="{96DAB2AB-B24C-B14E-96C5-DE7CB6C880F4}"/>
+              </a:ext>
+            </a:extLst>
+          </p:cNvPr>
+          <p:cNvSpPr txBox="1"/>
+          <p:nvPr/>
+        </p:nvSpPr>
+        <p:spPr>
+          <a:xfrm>
+            <a:off x="10858550" y="6445178"/>
+            <a:ext cx="1077539" cy="307777"/>
+          </a:xfrm>
+          <a:prstGeom prst="rect">
+            <a:avLst/>
+          </a:prstGeom>
+        </p:spPr>
+        <p:style>
+          <a:lnRef idx="2">
+            <a:schemeClr val="dk1"/>
+          </a:lnRef>
+          <a:fillRef idx="1">
+            <a:schemeClr val="lt1"/>
+          </a:fillRef>
+          <a:effectRef idx="0">
+            <a:schemeClr val="dk1"/>
+          </a:effectRef>
+          <a:fontRef idx="minor">
+            <a:schemeClr val="dk1"/>
+          </a:fontRef>
+        </p:style>
+        <p:txBody>
+          <a:bodyPr wrap="none" rtlCol="0">
+            <a:spAutoFit/>
+          </a:bodyPr>
+          <a:lstStyle/>
+          <a:p>
+            <a:pPr algn="l"/>
+            <a:r>
+              <a:rPr lang="en-US" sz="1400" err="1"/>
+              <a:t>plot_e_dom</a:t>
+            </a:r>
+            <a:endParaRPr lang="en-US" sz="1400"/>
+          </a:p>
+        </p:txBody>
+      </p:sp>
+      <p:sp>
+        <p:nvSpPr>
+          <p:cNvPr id="26" name="TextBox 25">
+            <a:extLst>
+              <a:ext uri="{FF2B5EF4-FFF2-40B4-BE49-F238E27FC236}">
+                <a16:creationId xmlns:a16="http://schemas.microsoft.com/office/drawing/2014/main" id="{43F1731D-E018-CF4E-8E4F-BEF1E2ED05DF}"/>
+              </a:ext>
+            </a:extLst>
+          </p:cNvPr>
+          <p:cNvSpPr txBox="1"/>
+          <p:nvPr/>
+        </p:nvSpPr>
+        <p:spPr>
+          <a:xfrm>
+            <a:off x="13654567" y="6413930"/>
+            <a:ext cx="1091966" cy="307777"/>
+          </a:xfrm>
+          <a:prstGeom prst="rect">
+            <a:avLst/>
+          </a:prstGeom>
+        </p:spPr>
+        <p:style>
+          <a:lnRef idx="2">
+            <a:schemeClr val="accent6"/>
+          </a:lnRef>
+          <a:fillRef idx="1">
+            <a:schemeClr val="lt1"/>
+          </a:fillRef>
+          <a:effectRef idx="0">
+            <a:schemeClr val="accent6"/>
+          </a:effectRef>
+          <a:fontRef idx="minor">
+            <a:schemeClr val="dk1"/>
+          </a:fontRef>
+        </p:style>
+        <p:txBody>
+          <a:bodyPr wrap="none" rtlCol="0">
+            <a:spAutoFit/>
+          </a:bodyPr>
+          <a:lstStyle/>
+          <a:p>
+            <a:pPr algn="l"/>
+            <a:r>
+              <a:rPr lang="en-US" sz="1400" b="1" err="1"/>
+              <a:t>e_dom_plot</a:t>
+            </a:r>
+            <a:endParaRPr lang="en-US" sz="1400" b="1"/>
+          </a:p>
+        </p:txBody>
+      </p:sp>
+      <p:cxnSp>
+        <p:nvCxnSpPr>
+          <p:cNvPr id="37" name="Straight Arrow Connector 36">
+            <a:extLst>
+              <a:ext uri="{FF2B5EF4-FFF2-40B4-BE49-F238E27FC236}">
+                <a16:creationId xmlns:a16="http://schemas.microsoft.com/office/drawing/2014/main" id="{5A94B14A-A705-AA44-8EC0-5DF5261BE643}"/>
+              </a:ext>
+            </a:extLst>
+          </p:cNvPr>
+          <p:cNvCxnSpPr>
+            <a:cxnSpLocks/>
+            <a:stCxn id="18" idx="3"/>
+            <a:endCxn id="25" idx="1"/>
+          </p:cNvCxnSpPr>
+          <p:nvPr/>
+        </p:nvCxnSpPr>
+        <p:spPr>
+          <a:xfrm>
+            <a:off x="9025070" y="6584522"/>
+            <a:ext cx="1833480" cy="14545"/>
+          </a:xfrm>
+          <a:prstGeom prst="straightConnector1">
+            <a:avLst/>
+          </a:prstGeom>
+          <a:ln w="9525" cap="flat" cmpd="sng" algn="ctr">
+            <a:solidFill>
+              <a:schemeClr val="dk1"/>
+            </a:solidFill>
+            <a:prstDash val="solid"/>
+            <a:round/>
+            <a:headEnd type="none" w="med" len="med"/>
+            <a:tailEnd type="triangle"/>
+          </a:ln>
+        </p:spPr>
+        <p:style>
+          <a:lnRef idx="0">
+            <a:scrgbClr r="0" g="0" b="0"/>
+          </a:lnRef>
+          <a:fillRef idx="0">
+            <a:scrgbClr r="0" g="0" b="0"/>
+          </a:fillRef>
+          <a:effectRef idx="0">
+            <a:scrgbClr r="0" g="0" b="0"/>
+          </a:effectRef>
+          <a:fontRef idx="minor">
+            <a:schemeClr val="tx1"/>
+          </a:fontRef>
+        </p:style>
+      </p:cxnSp>
+      <p:cxnSp>
+        <p:nvCxnSpPr>
+          <p:cNvPr id="44" name="Straight Arrow Connector 43">
+            <a:extLst>
+              <a:ext uri="{FF2B5EF4-FFF2-40B4-BE49-F238E27FC236}">
+                <a16:creationId xmlns:a16="http://schemas.microsoft.com/office/drawing/2014/main" id="{46FC5534-B0A6-4444-B9EA-23278A3E9FFD}"/>
+              </a:ext>
+            </a:extLst>
+          </p:cNvPr>
+          <p:cNvCxnSpPr>
+            <a:cxnSpLocks/>
+            <a:stCxn id="25" idx="3"/>
+            <a:endCxn id="26" idx="1"/>
+          </p:cNvCxnSpPr>
+          <p:nvPr/>
+        </p:nvCxnSpPr>
+        <p:spPr>
+          <a:xfrm flipV="1">
+            <a:off x="11936089" y="6567819"/>
+            <a:ext cx="1718478" cy="31248"/>
+          </a:xfrm>
+          <a:prstGeom prst="straightConnector1">
+            <a:avLst/>
+          </a:prstGeom>
+          <a:ln w="9525" cap="flat" cmpd="sng" algn="ctr">
+            <a:solidFill>
+              <a:schemeClr val="dk1"/>
+            </a:solidFill>
+            <a:prstDash val="solid"/>
+            <a:round/>
+            <a:headEnd type="none" w="med" len="med"/>
+            <a:tailEnd type="triangle"/>
+          </a:ln>
+        </p:spPr>
+        <p:style>
+          <a:lnRef idx="0">
+            <a:scrgbClr r="0" g="0" b="0"/>
+          </a:lnRef>
+          <a:fillRef idx="0">
+            <a:scrgbClr r="0" g="0" b="0"/>
+          </a:fillRef>
+          <a:effectRef idx="0">
+            <a:scrgbClr r="0" g="0" b="0"/>
+          </a:effectRef>
+          <a:fontRef idx="minor">
+            <a:schemeClr val="tx1"/>
+          </a:fontRef>
+        </p:style>
+      </p:cxnSp>
+      <p:sp>
+        <p:nvSpPr>
+          <p:cNvPr id="57" name="TextBox 56">
+            <a:extLst>
+              <a:ext uri="{FF2B5EF4-FFF2-40B4-BE49-F238E27FC236}">
+                <a16:creationId xmlns:a16="http://schemas.microsoft.com/office/drawing/2014/main" id="{83C4BD25-D9B3-1745-98B9-6BA35EE251AC}"/>
+              </a:ext>
+            </a:extLst>
+          </p:cNvPr>
+          <p:cNvSpPr txBox="1"/>
+          <p:nvPr/>
+        </p:nvSpPr>
+        <p:spPr>
+          <a:xfrm>
+            <a:off x="7742189" y="7889662"/>
+            <a:ext cx="2113848" cy="307777"/>
+          </a:xfrm>
+          <a:prstGeom prst="rect">
+            <a:avLst/>
+          </a:prstGeom>
+        </p:spPr>
+        <p:style>
+          <a:lnRef idx="2">
+            <a:schemeClr val="accent2"/>
+          </a:lnRef>
+          <a:fillRef idx="1">
+            <a:schemeClr val="lt1"/>
+          </a:fillRef>
+          <a:effectRef idx="0">
+            <a:schemeClr val="accent2"/>
+          </a:effectRef>
+          <a:fontRef idx="minor">
+            <a:schemeClr val="dk1"/>
+          </a:fontRef>
+        </p:style>
+        <p:txBody>
+          <a:bodyPr wrap="none" rtlCol="0">
+            <a:spAutoFit/>
+          </a:bodyPr>
+          <a:lstStyle/>
+          <a:p>
+            <a:pPr algn="l"/>
+            <a:r>
+              <a:rPr lang="en-US" sz="1400" b="1"/>
+              <a:t>bsed_uniform_bootstraps</a:t>
+            </a:r>
+            <a:endParaRPr lang="en-US" sz="1400" b="1" dirty="0"/>
+          </a:p>
+        </p:txBody>
+      </p:sp>
+      <p:sp>
+        <p:nvSpPr>
+          <p:cNvPr id="59" name="TextBox 58">
+            <a:extLst>
+              <a:ext uri="{FF2B5EF4-FFF2-40B4-BE49-F238E27FC236}">
+                <a16:creationId xmlns:a16="http://schemas.microsoft.com/office/drawing/2014/main" id="{B6AA257B-92CA-EC41-A97E-8349EB1A33B4}"/>
+              </a:ext>
+            </a:extLst>
+          </p:cNvPr>
+          <p:cNvSpPr txBox="1"/>
+          <p:nvPr/>
+        </p:nvSpPr>
+        <p:spPr>
+          <a:xfrm>
+            <a:off x="4519489" y="8197439"/>
+            <a:ext cx="2676630" cy="738664"/>
+          </a:xfrm>
+          <a:prstGeom prst="rect">
+            <a:avLst/>
+          </a:prstGeom>
+        </p:spPr>
+        <p:style>
+          <a:lnRef idx="2">
+            <a:schemeClr val="dk1"/>
+          </a:lnRef>
+          <a:fillRef idx="1">
+            <a:schemeClr val="lt1"/>
+          </a:fillRef>
+          <a:effectRef idx="0">
+            <a:schemeClr val="dk1"/>
+          </a:effectRef>
+          <a:fontRef idx="minor">
+            <a:schemeClr val="dk1"/>
+          </a:fontRef>
+        </p:style>
+        <p:txBody>
+          <a:bodyPr wrap="none" rtlCol="0">
+            <a:spAutoFit/>
+          </a:bodyPr>
+          <a:lstStyle/>
+          <a:p>
+            <a:pPr algn="l"/>
+            <a:r>
+              <a:rPr lang="en-US" sz="1400"/>
+              <a:t>community_bootstrap(</a:t>
+            </a:r>
+          </a:p>
+          <a:p>
+            <a:pPr algn="l"/>
+            <a:r>
+              <a:rPr lang="en-US" sz="1400"/>
+              <a:t>communities, bootstrap_function,</a:t>
+            </a:r>
+          </a:p>
+          <a:p>
+            <a:pPr algn="l"/>
+            <a:r>
+              <a:rPr lang="en-US" sz="1400"/>
+              <a:t>nbootstraps)</a:t>
+            </a:r>
+            <a:endParaRPr lang="en-US" sz="1400" dirty="0"/>
+          </a:p>
+        </p:txBody>
+      </p:sp>
+      <p:cxnSp>
+        <p:nvCxnSpPr>
+          <p:cNvPr id="61" name="Straight Arrow Connector 60">
+            <a:extLst>
+              <a:ext uri="{FF2B5EF4-FFF2-40B4-BE49-F238E27FC236}">
+                <a16:creationId xmlns:a16="http://schemas.microsoft.com/office/drawing/2014/main" id="{097A4A47-6F38-E24F-9A97-261414FA8EE3}"/>
+              </a:ext>
+            </a:extLst>
+          </p:cNvPr>
+          <p:cNvCxnSpPr>
+            <a:stCxn id="17" idx="1"/>
+            <a:endCxn id="59" idx="0"/>
+          </p:cNvCxnSpPr>
+          <p:nvPr/>
+        </p:nvCxnSpPr>
+        <p:spPr>
+          <a:xfrm flipH="1">
+            <a:off x="5857804" y="2828421"/>
+            <a:ext cx="1884385" cy="5369018"/>
+          </a:xfrm>
+          <a:prstGeom prst="straightConnector1">
+            <a:avLst/>
+          </a:prstGeom>
+          <a:ln w="9525" cap="flat" cmpd="sng" algn="ctr">
+            <a:solidFill>
+              <a:schemeClr val="dk1"/>
+            </a:solidFill>
+            <a:prstDash val="solid"/>
+            <a:round/>
+            <a:headEnd type="none" w="med" len="med"/>
+            <a:tailEnd type="triangle"/>
+          </a:ln>
+        </p:spPr>
+        <p:style>
+          <a:lnRef idx="0">
+            <a:scrgbClr r="0" g="0" b="0"/>
+          </a:lnRef>
+          <a:fillRef idx="0">
+            <a:scrgbClr r="0" g="0" b="0"/>
+          </a:fillRef>
+          <a:effectRef idx="0">
+            <a:scrgbClr r="0" g="0" b="0"/>
+          </a:effectRef>
+          <a:fontRef idx="minor">
+            <a:schemeClr val="tx1"/>
+          </a:fontRef>
+        </p:style>
+      </p:cxnSp>
+      <p:sp>
+        <p:nvSpPr>
+          <p:cNvPr id="62" name="TextBox 61">
+            <a:extLst>
+              <a:ext uri="{FF2B5EF4-FFF2-40B4-BE49-F238E27FC236}">
+                <a16:creationId xmlns:a16="http://schemas.microsoft.com/office/drawing/2014/main" id="{3A873731-8E7F-AA4E-BB6A-B37E88F6D992}"/>
+              </a:ext>
+            </a:extLst>
+          </p:cNvPr>
+          <p:cNvSpPr txBox="1"/>
+          <p:nvPr/>
+        </p:nvSpPr>
+        <p:spPr>
+          <a:xfrm>
+            <a:off x="1763486" y="7497777"/>
+            <a:ext cx="2087303" cy="523220"/>
+          </a:xfrm>
+          <a:prstGeom prst="rect">
+            <a:avLst/>
+          </a:prstGeom>
+        </p:spPr>
+        <p:style>
+          <a:lnRef idx="2">
+            <a:schemeClr val="dk1"/>
+          </a:lnRef>
+          <a:fillRef idx="1">
+            <a:schemeClr val="lt1"/>
+          </a:fillRef>
+          <a:effectRef idx="0">
+            <a:schemeClr val="dk1"/>
+          </a:effectRef>
+          <a:fontRef idx="minor">
+            <a:schemeClr val="dk1"/>
+          </a:fontRef>
+        </p:style>
+        <p:txBody>
+          <a:bodyPr wrap="none" rtlCol="0">
+            <a:spAutoFit/>
+          </a:bodyPr>
+          <a:lstStyle/>
+          <a:p>
+            <a:pPr algn="l"/>
+            <a:r>
+              <a:rPr lang="en-US" sz="1400"/>
+              <a:t>bootstrap_unif_bsed_doi(</a:t>
+            </a:r>
+          </a:p>
+          <a:p>
+            <a:pPr algn="l"/>
+            <a:r>
+              <a:rPr lang="en-US" sz="1400"/>
+              <a:t>community_df)</a:t>
+            </a:r>
+            <a:endParaRPr lang="en-US" sz="1400" dirty="0"/>
+          </a:p>
+        </p:txBody>
+      </p:sp>
+      <p:cxnSp>
+        <p:nvCxnSpPr>
+          <p:cNvPr id="64" name="Straight Arrow Connector 63">
+            <a:extLst>
+              <a:ext uri="{FF2B5EF4-FFF2-40B4-BE49-F238E27FC236}">
+                <a16:creationId xmlns:a16="http://schemas.microsoft.com/office/drawing/2014/main" id="{AF09D11D-D3B0-9448-B111-429D708A0288}"/>
+              </a:ext>
+            </a:extLst>
+          </p:cNvPr>
+          <p:cNvCxnSpPr>
+            <a:stCxn id="62" idx="3"/>
+            <a:endCxn id="59" idx="0"/>
+          </p:cNvCxnSpPr>
+          <p:nvPr/>
+        </p:nvCxnSpPr>
+        <p:spPr>
+          <a:xfrm>
+            <a:off x="3850789" y="7759387"/>
+            <a:ext cx="2007015" cy="438052"/>
+          </a:xfrm>
+          <a:prstGeom prst="straightConnector1">
+            <a:avLst/>
+          </a:prstGeom>
+          <a:ln w="9525" cap="flat" cmpd="sng" algn="ctr">
+            <a:solidFill>
+              <a:schemeClr val="dk1"/>
+            </a:solidFill>
+            <a:prstDash val="solid"/>
+            <a:round/>
+            <a:headEnd type="none" w="med" len="med"/>
+            <a:tailEnd type="triangle"/>
+          </a:ln>
+        </p:spPr>
+        <p:style>
+          <a:lnRef idx="0">
+            <a:scrgbClr r="0" g="0" b="0"/>
+          </a:lnRef>
+          <a:fillRef idx="0">
+            <a:scrgbClr r="0" g="0" b="0"/>
+          </a:fillRef>
+          <a:effectRef idx="0">
+            <a:scrgbClr r="0" g="0" b="0"/>
+          </a:effectRef>
+          <a:fontRef idx="minor">
+            <a:schemeClr val="tx1"/>
+          </a:fontRef>
+        </p:style>
+      </p:cxnSp>
+      <p:cxnSp>
+        <p:nvCxnSpPr>
+          <p:cNvPr id="66" name="Straight Arrow Connector 65">
+            <a:extLst>
+              <a:ext uri="{FF2B5EF4-FFF2-40B4-BE49-F238E27FC236}">
+                <a16:creationId xmlns:a16="http://schemas.microsoft.com/office/drawing/2014/main" id="{0A219BB1-5272-D049-BE6A-625AD812FC13}"/>
+              </a:ext>
+            </a:extLst>
+          </p:cNvPr>
+          <p:cNvCxnSpPr>
+            <a:stCxn id="59" idx="0"/>
+            <a:endCxn id="57" idx="1"/>
+          </p:cNvCxnSpPr>
+          <p:nvPr/>
+        </p:nvCxnSpPr>
+        <p:spPr>
+          <a:xfrm flipV="1">
+            <a:off x="5857804" y="8043551"/>
+            <a:ext cx="1884385" cy="153888"/>
+          </a:xfrm>
+          <a:prstGeom prst="straightConnector1">
+            <a:avLst/>
+          </a:prstGeom>
+          <a:ln w="9525" cap="flat" cmpd="sng" algn="ctr">
+            <a:solidFill>
+              <a:schemeClr val="dk1"/>
+            </a:solidFill>
+            <a:prstDash val="solid"/>
+            <a:round/>
+            <a:headEnd type="none" w="med" len="med"/>
+            <a:tailEnd type="triangle"/>
+          </a:ln>
+        </p:spPr>
+        <p:style>
+          <a:lnRef idx="0">
+            <a:scrgbClr r="0" g="0" b="0"/>
+          </a:lnRef>
+          <a:fillRef idx="0">
+            <a:scrgbClr r="0" g="0" b="0"/>
+          </a:fillRef>
+          <a:effectRef idx="0">
+            <a:scrgbClr r="0" g="0" b="0"/>
+          </a:effectRef>
+          <a:fontRef idx="minor">
+            <a:schemeClr val="tx1"/>
+          </a:fontRef>
+        </p:style>
+      </p:cxnSp>
+      <p:cxnSp>
+        <p:nvCxnSpPr>
+          <p:cNvPr id="68" name="Elbow Connector 67">
+            <a:extLst>
+              <a:ext uri="{FF2B5EF4-FFF2-40B4-BE49-F238E27FC236}">
+                <a16:creationId xmlns:a16="http://schemas.microsoft.com/office/drawing/2014/main" id="{361D81D7-D480-2A42-B68A-6926C9906188}"/>
+              </a:ext>
+            </a:extLst>
+          </p:cNvPr>
+          <p:cNvCxnSpPr>
+            <a:cxnSpLocks/>
+          </p:cNvCxnSpPr>
+          <p:nvPr/>
+        </p:nvCxnSpPr>
+        <p:spPr>
+          <a:xfrm rot="10800000" flipH="1" flipV="1">
+            <a:off x="2739897" y="3458035"/>
+            <a:ext cx="1797755" cy="5120627"/>
+          </a:xfrm>
+          <a:prstGeom prst="bentConnector3">
+            <a:avLst>
+              <a:gd name="adj1" fmla="val -121563"/>
+            </a:avLst>
+          </a:prstGeom>
+          <a:ln w="9525" cap="flat" cmpd="sng" algn="ctr">
+            <a:solidFill>
+              <a:schemeClr val="dk1"/>
+            </a:solidFill>
+            <a:prstDash val="solid"/>
+            <a:round/>
+            <a:headEnd type="none" w="med" len="med"/>
+            <a:tailEnd type="triangle"/>
+          </a:ln>
+        </p:spPr>
+        <p:style>
+          <a:lnRef idx="0">
+            <a:scrgbClr r="0" g="0" b="0"/>
+          </a:lnRef>
+          <a:fillRef idx="0">
+            <a:scrgbClr r="0" g="0" b="0"/>
+          </a:fillRef>
+          <a:effectRef idx="0">
+            <a:scrgbClr r="0" g="0" b="0"/>
+          </a:effectRef>
+          <a:fontRef idx="minor">
+            <a:schemeClr val="tx1"/>
+          </a:fontRef>
+        </p:style>
+      </p:cxnSp>
+      <p:sp>
+        <p:nvSpPr>
+          <p:cNvPr id="74" name="TextBox 73">
+            <a:extLst>
+              <a:ext uri="{FF2B5EF4-FFF2-40B4-BE49-F238E27FC236}">
+                <a16:creationId xmlns:a16="http://schemas.microsoft.com/office/drawing/2014/main" id="{D0859B37-515D-3045-B8B1-45A9461DDFAA}"/>
+              </a:ext>
+            </a:extLst>
+          </p:cNvPr>
+          <p:cNvSpPr txBox="1"/>
+          <p:nvPr/>
+        </p:nvSpPr>
+        <p:spPr>
+          <a:xfrm>
+            <a:off x="696387" y="7889662"/>
+            <a:ext cx="524503" cy="307777"/>
+          </a:xfrm>
+          <a:prstGeom prst="rect">
+            <a:avLst/>
+          </a:prstGeom>
+        </p:spPr>
+        <p:style>
+          <a:lnRef idx="2">
+            <a:schemeClr val="dk1"/>
+          </a:lnRef>
+          <a:fillRef idx="1">
+            <a:schemeClr val="lt1"/>
+          </a:fillRef>
+          <a:effectRef idx="0">
+            <a:schemeClr val="dk1"/>
+          </a:effectRef>
+          <a:fontRef idx="minor">
+            <a:schemeClr val="dk1"/>
+          </a:fontRef>
+        </p:style>
+        <p:txBody>
+          <a:bodyPr wrap="none" rtlCol="0">
+            <a:spAutoFit/>
+          </a:bodyPr>
+          <a:lstStyle/>
+          <a:p>
+            <a:pPr algn="l"/>
+            <a:r>
+              <a:rPr lang="en-US" sz="1400"/>
+              <a:t>doi()</a:t>
+            </a:r>
+            <a:endParaRPr lang="en-US" sz="1400" dirty="0"/>
+          </a:p>
+        </p:txBody>
+      </p:sp>
+      <p:cxnSp>
+        <p:nvCxnSpPr>
+          <p:cNvPr id="78" name="Elbow Connector 77">
+            <a:extLst>
+              <a:ext uri="{FF2B5EF4-FFF2-40B4-BE49-F238E27FC236}">
+                <a16:creationId xmlns:a16="http://schemas.microsoft.com/office/drawing/2014/main" id="{00768950-8BE3-0544-A606-70756B415A1F}"/>
+              </a:ext>
+            </a:extLst>
+          </p:cNvPr>
+          <p:cNvCxnSpPr>
+            <a:cxnSpLocks/>
+            <a:stCxn id="74" idx="3"/>
+            <a:endCxn id="59" idx="1"/>
+          </p:cNvCxnSpPr>
+          <p:nvPr/>
+        </p:nvCxnSpPr>
+        <p:spPr>
+          <a:xfrm>
+            <a:off x="1220890" y="8043551"/>
+            <a:ext cx="3298599" cy="523220"/>
+          </a:xfrm>
+          <a:prstGeom prst="bentConnector3">
+            <a:avLst>
+              <a:gd name="adj1" fmla="val 50000"/>
+            </a:avLst>
+          </a:prstGeom>
+          <a:ln w="9525" cap="flat" cmpd="sng" algn="ctr">
+            <a:solidFill>
+              <a:schemeClr val="dk1"/>
+            </a:solidFill>
+            <a:prstDash val="solid"/>
+            <a:round/>
+            <a:headEnd type="none" w="med" len="med"/>
+            <a:tailEnd type="triangle"/>
+          </a:ln>
+        </p:spPr>
+        <p:style>
+          <a:lnRef idx="0">
+            <a:scrgbClr r="0" g="0" b="0"/>
+          </a:lnRef>
+          <a:fillRef idx="0">
+            <a:scrgbClr r="0" g="0" b="0"/>
+          </a:fillRef>
+          <a:effectRef idx="0">
+            <a:scrgbClr r="0" g="0" b="0"/>
+          </a:effectRef>
+          <a:fontRef idx="minor">
+            <a:schemeClr val="tx1"/>
+          </a:fontRef>
+        </p:style>
+      </p:cxnSp>
+      <p:cxnSp>
+        <p:nvCxnSpPr>
+          <p:cNvPr id="80" name="Elbow Connector 79">
+            <a:extLst>
+              <a:ext uri="{FF2B5EF4-FFF2-40B4-BE49-F238E27FC236}">
+                <a16:creationId xmlns:a16="http://schemas.microsoft.com/office/drawing/2014/main" id="{531C946D-95E8-2B43-92CA-1582B7EB8102}"/>
+              </a:ext>
+            </a:extLst>
+          </p:cNvPr>
+          <p:cNvCxnSpPr>
+            <a:stCxn id="27" idx="1"/>
+            <a:endCxn id="62" idx="0"/>
+          </p:cNvCxnSpPr>
+          <p:nvPr/>
+        </p:nvCxnSpPr>
+        <p:spPr>
+          <a:xfrm rot="10800000" flipH="1" flipV="1">
+            <a:off x="2612006" y="3446143"/>
+            <a:ext cx="195132" cy="4051633"/>
+          </a:xfrm>
+          <a:prstGeom prst="bentConnector4">
+            <a:avLst>
+              <a:gd name="adj1" fmla="val -829432"/>
+              <a:gd name="adj2" fmla="val 83921"/>
+            </a:avLst>
+          </a:prstGeom>
+          <a:ln w="9525" cap="flat" cmpd="sng" algn="ctr">
+            <a:solidFill>
+              <a:schemeClr val="dk1"/>
+            </a:solidFill>
+            <a:prstDash val="solid"/>
+            <a:round/>
+            <a:headEnd type="none" w="med" len="med"/>
+            <a:tailEnd type="triangle"/>
+          </a:ln>
+        </p:spPr>
+        <p:style>
+          <a:lnRef idx="0">
+            <a:scrgbClr r="0" g="0" b="0"/>
+          </a:lnRef>
+          <a:fillRef idx="0">
+            <a:scrgbClr r="0" g="0" b="0"/>
+          </a:fillRef>
+          <a:effectRef idx="0">
+            <a:scrgbClr r="0" g="0" b="0"/>
+          </a:effectRef>
+          <a:fontRef idx="minor">
+            <a:schemeClr val="tx1"/>
+          </a:fontRef>
+        </p:style>
+      </p:cxnSp>
+      <p:cxnSp>
+        <p:nvCxnSpPr>
+          <p:cNvPr id="83" name="Elbow Connector 82">
+            <a:extLst>
+              <a:ext uri="{FF2B5EF4-FFF2-40B4-BE49-F238E27FC236}">
+                <a16:creationId xmlns:a16="http://schemas.microsoft.com/office/drawing/2014/main" id="{CAC4E69D-BF05-894A-BCB8-E8F75E25FB0A}"/>
+              </a:ext>
+            </a:extLst>
+          </p:cNvPr>
+          <p:cNvCxnSpPr>
+            <a:stCxn id="33" idx="1"/>
+            <a:endCxn id="62" idx="0"/>
+          </p:cNvCxnSpPr>
+          <p:nvPr/>
+        </p:nvCxnSpPr>
+        <p:spPr>
+          <a:xfrm rot="10800000" flipH="1" flipV="1">
+            <a:off x="2721088" y="4325477"/>
+            <a:ext cx="86050" cy="3172300"/>
+          </a:xfrm>
+          <a:prstGeom prst="bentConnector4">
+            <a:avLst>
+              <a:gd name="adj1" fmla="val -1392056"/>
+              <a:gd name="adj2" fmla="val 54123"/>
+            </a:avLst>
+          </a:prstGeom>
+          <a:ln w="9525" cap="flat" cmpd="sng" algn="ctr">
+            <a:solidFill>
+              <a:schemeClr val="dk1"/>
+            </a:solidFill>
+            <a:prstDash val="solid"/>
+            <a:round/>
+            <a:headEnd type="none" w="med" len="med"/>
+            <a:tailEnd type="triangle"/>
+          </a:ln>
+        </p:spPr>
+        <p:style>
+          <a:lnRef idx="0">
+            <a:scrgbClr r="0" g="0" b="0"/>
+          </a:lnRef>
+          <a:fillRef idx="0">
+            <a:scrgbClr r="0" g="0" b="0"/>
+          </a:fillRef>
+          <a:effectRef idx="0">
+            <a:scrgbClr r="0" g="0" b="0"/>
+          </a:effectRef>
+          <a:fontRef idx="minor">
+            <a:schemeClr val="tx1"/>
+          </a:fontRef>
+        </p:style>
+      </p:cxnSp>
+      <p:cxnSp>
+        <p:nvCxnSpPr>
+          <p:cNvPr id="89" name="Elbow Connector 88">
+            <a:extLst>
+              <a:ext uri="{FF2B5EF4-FFF2-40B4-BE49-F238E27FC236}">
+                <a16:creationId xmlns:a16="http://schemas.microsoft.com/office/drawing/2014/main" id="{052B59DA-4ECC-4847-B22E-335E02134B7D}"/>
+              </a:ext>
+            </a:extLst>
+          </p:cNvPr>
+          <p:cNvCxnSpPr>
+            <a:stCxn id="74" idx="3"/>
+            <a:endCxn id="62" idx="1"/>
+          </p:cNvCxnSpPr>
+          <p:nvPr/>
+        </p:nvCxnSpPr>
+        <p:spPr>
+          <a:xfrm flipV="1">
+            <a:off x="1220890" y="7759387"/>
+            <a:ext cx="542596" cy="284164"/>
+          </a:xfrm>
+          <a:prstGeom prst="bentConnector3">
+            <a:avLst>
+              <a:gd name="adj1" fmla="val 50000"/>
+            </a:avLst>
+          </a:prstGeom>
+          <a:ln w="9525" cap="flat" cmpd="sng" algn="ctr">
+            <a:solidFill>
+              <a:schemeClr val="dk1"/>
+            </a:solidFill>
+            <a:prstDash val="solid"/>
+            <a:round/>
+            <a:headEnd type="none" w="med" len="med"/>
+            <a:tailEnd type="triangle"/>
+          </a:ln>
+        </p:spPr>
+        <p:style>
+          <a:lnRef idx="0">
+            <a:scrgbClr r="0" g="0" b="0"/>
+          </a:lnRef>
+          <a:fillRef idx="0">
+            <a:scrgbClr r="0" g="0" b="0"/>
+          </a:fillRef>
+          <a:effectRef idx="0">
+            <a:scrgbClr r="0" g="0" b="0"/>
+          </a:effectRef>
+          <a:fontRef idx="minor">
+            <a:schemeClr val="tx1"/>
+          </a:fontRef>
+        </p:style>
+      </p:cxnSp>
+      <p:sp>
+        <p:nvSpPr>
+          <p:cNvPr id="93" name="TextBox 92">
+            <a:extLst>
+              <a:ext uri="{FF2B5EF4-FFF2-40B4-BE49-F238E27FC236}">
+                <a16:creationId xmlns:a16="http://schemas.microsoft.com/office/drawing/2014/main" id="{75DA8D07-D406-D540-B06D-984FFA65FA6D}"/>
+              </a:ext>
+            </a:extLst>
+          </p:cNvPr>
+          <p:cNvSpPr txBox="1"/>
+          <p:nvPr/>
+        </p:nvSpPr>
+        <p:spPr>
+          <a:xfrm>
+            <a:off x="15285113" y="962704"/>
+            <a:ext cx="1506438" cy="307777"/>
+          </a:xfrm>
+          <a:prstGeom prst="rect">
+            <a:avLst/>
+          </a:prstGeom>
+        </p:spPr>
+        <p:style>
+          <a:lnRef idx="2">
+            <a:schemeClr val="accent5"/>
+          </a:lnRef>
+          <a:fillRef idx="1">
+            <a:schemeClr val="lt1"/>
+          </a:fillRef>
+          <a:effectRef idx="0">
+            <a:schemeClr val="accent5"/>
+          </a:effectRef>
+          <a:fontRef idx="minor">
+            <a:schemeClr val="dk1"/>
+          </a:fontRef>
+        </p:style>
+        <p:txBody>
+          <a:bodyPr wrap="none" rtlCol="0">
+            <a:spAutoFit/>
+          </a:bodyPr>
+          <a:lstStyle/>
+          <a:p>
+            <a:pPr algn="l"/>
+            <a:r>
+              <a:rPr lang="en-US" sz="1400"/>
+              <a:t>data/paper/raw/*</a:t>
+            </a:r>
+            <a:endParaRPr lang="en-US" sz="1400" dirty="0"/>
+          </a:p>
+        </p:txBody>
+      </p:sp>
+      <p:cxnSp>
+        <p:nvCxnSpPr>
+          <p:cNvPr id="95" name="Straight Arrow Connector 94">
+            <a:extLst>
+              <a:ext uri="{FF2B5EF4-FFF2-40B4-BE49-F238E27FC236}">
+                <a16:creationId xmlns:a16="http://schemas.microsoft.com/office/drawing/2014/main" id="{B70E26ED-6489-4B43-82AD-3D97667938BE}"/>
+              </a:ext>
+            </a:extLst>
+          </p:cNvPr>
+          <p:cNvCxnSpPr>
+            <a:stCxn id="6" idx="3"/>
+            <a:endCxn id="93" idx="1"/>
+          </p:cNvCxnSpPr>
+          <p:nvPr/>
+        </p:nvCxnSpPr>
+        <p:spPr>
+          <a:xfrm>
+            <a:off x="4792288" y="750614"/>
+            <a:ext cx="10492825" cy="365979"/>
+          </a:xfrm>
+          <a:prstGeom prst="straightConnector1">
+            <a:avLst/>
+          </a:prstGeom>
+          <a:ln w="9525" cap="flat" cmpd="sng" algn="ctr">
+            <a:solidFill>
+              <a:schemeClr val="dk1"/>
+            </a:solidFill>
+            <a:prstDash val="solid"/>
+            <a:round/>
+            <a:headEnd type="none" w="med" len="med"/>
+            <a:tailEnd type="triangle"/>
+          </a:ln>
+        </p:spPr>
+        <p:style>
+          <a:lnRef idx="0">
+            <a:scrgbClr r="0" g="0" b="0"/>
+          </a:lnRef>
+          <a:fillRef idx="0">
+            <a:scrgbClr r="0" g="0" b="0"/>
+          </a:fillRef>
+          <a:effectRef idx="0">
+            <a:scrgbClr r="0" g="0" b="0"/>
+          </a:effectRef>
+          <a:fontRef idx="minor">
+            <a:schemeClr val="tx1"/>
+          </a:fontRef>
+        </p:style>
+      </p:cxnSp>
+      <p:sp>
+        <p:nvSpPr>
+          <p:cNvPr id="96" name="TextBox 95">
+            <a:extLst>
+              <a:ext uri="{FF2B5EF4-FFF2-40B4-BE49-F238E27FC236}">
+                <a16:creationId xmlns:a16="http://schemas.microsoft.com/office/drawing/2014/main" id="{CAB895DB-B6A0-5F47-94F1-D7F10A129A8D}"/>
+              </a:ext>
+            </a:extLst>
+          </p:cNvPr>
+          <p:cNvSpPr txBox="1"/>
+          <p:nvPr/>
+        </p:nvSpPr>
+        <p:spPr>
+          <a:xfrm>
+            <a:off x="15285113" y="1557537"/>
+            <a:ext cx="1973297" cy="307777"/>
+          </a:xfrm>
+          <a:prstGeom prst="rect">
+            <a:avLst/>
+          </a:prstGeom>
+        </p:spPr>
+        <p:style>
+          <a:lnRef idx="2">
+            <a:schemeClr val="accent5"/>
+          </a:lnRef>
+          <a:fillRef idx="1">
+            <a:schemeClr val="lt1"/>
+          </a:fillRef>
+          <a:effectRef idx="0">
+            <a:schemeClr val="accent5"/>
+          </a:effectRef>
+          <a:fontRef idx="minor">
+            <a:schemeClr val="dk1"/>
+          </a:fontRef>
+        </p:style>
+        <p:txBody>
+          <a:bodyPr wrap="none" rtlCol="0">
+            <a:spAutoFit/>
+          </a:bodyPr>
+          <a:lstStyle/>
+          <a:p>
+            <a:pPr algn="l"/>
+            <a:r>
+              <a:rPr lang="en-US" sz="1400"/>
+              <a:t>data/paper/processed/*</a:t>
+            </a:r>
+            <a:endParaRPr lang="en-US" sz="1400" dirty="0"/>
+          </a:p>
+        </p:txBody>
+      </p:sp>
+      <p:cxnSp>
+        <p:nvCxnSpPr>
+          <p:cNvPr id="101" name="Straight Arrow Connector 100">
+            <a:extLst>
+              <a:ext uri="{FF2B5EF4-FFF2-40B4-BE49-F238E27FC236}">
+                <a16:creationId xmlns:a16="http://schemas.microsoft.com/office/drawing/2014/main" id="{5FE8DD9C-3D05-514C-AAC6-FA1A637A7C00}"/>
+              </a:ext>
+            </a:extLst>
+          </p:cNvPr>
+          <p:cNvCxnSpPr>
+            <a:stCxn id="93" idx="1"/>
+            <a:endCxn id="8" idx="0"/>
+          </p:cNvCxnSpPr>
+          <p:nvPr/>
+        </p:nvCxnSpPr>
+        <p:spPr>
+          <a:xfrm flipH="1">
+            <a:off x="3966674" y="1116593"/>
+            <a:ext cx="11318439" cy="369331"/>
+          </a:xfrm>
+          <a:prstGeom prst="straightConnector1">
+            <a:avLst/>
+          </a:prstGeom>
+          <a:ln w="9525" cap="flat" cmpd="sng" algn="ctr">
+            <a:solidFill>
+              <a:schemeClr val="dk1"/>
+            </a:solidFill>
+            <a:prstDash val="solid"/>
+            <a:round/>
+            <a:headEnd type="none" w="med" len="med"/>
+            <a:tailEnd type="triangle"/>
+          </a:ln>
+        </p:spPr>
+        <p:style>
+          <a:lnRef idx="0">
+            <a:scrgbClr r="0" g="0" b="0"/>
+          </a:lnRef>
+          <a:fillRef idx="0">
+            <a:scrgbClr r="0" g="0" b="0"/>
+          </a:fillRef>
+          <a:effectRef idx="0">
+            <a:scrgbClr r="0" g="0" b="0"/>
+          </a:effectRef>
+          <a:fontRef idx="minor">
+            <a:schemeClr val="tx1"/>
+          </a:fontRef>
+        </p:style>
+      </p:cxnSp>
+      <p:cxnSp>
+        <p:nvCxnSpPr>
+          <p:cNvPr id="103" name="Straight Arrow Connector 102">
+            <a:extLst>
+              <a:ext uri="{FF2B5EF4-FFF2-40B4-BE49-F238E27FC236}">
+                <a16:creationId xmlns:a16="http://schemas.microsoft.com/office/drawing/2014/main" id="{2942BF03-BCAC-EC44-9FE6-CE88DF0D6740}"/>
+              </a:ext>
+            </a:extLst>
+          </p:cNvPr>
+          <p:cNvCxnSpPr>
+            <a:stCxn id="8" idx="3"/>
+            <a:endCxn id="96" idx="1"/>
+          </p:cNvCxnSpPr>
+          <p:nvPr/>
+        </p:nvCxnSpPr>
+        <p:spPr>
+          <a:xfrm flipV="1">
+            <a:off x="5092848" y="1711426"/>
+            <a:ext cx="10192265" cy="36108"/>
+          </a:xfrm>
+          <a:prstGeom prst="straightConnector1">
+            <a:avLst/>
+          </a:prstGeom>
+          <a:ln w="9525" cap="flat" cmpd="sng" algn="ctr">
+            <a:solidFill>
+              <a:schemeClr val="dk1"/>
+            </a:solidFill>
+            <a:prstDash val="solid"/>
+            <a:round/>
+            <a:headEnd type="none" w="med" len="med"/>
+            <a:tailEnd type="triangle"/>
+          </a:ln>
+        </p:spPr>
+        <p:style>
+          <a:lnRef idx="0">
+            <a:scrgbClr r="0" g="0" b="0"/>
+          </a:lnRef>
+          <a:fillRef idx="0">
+            <a:scrgbClr r="0" g="0" b="0"/>
+          </a:fillRef>
+          <a:effectRef idx="0">
+            <a:scrgbClr r="0" g="0" b="0"/>
+          </a:effectRef>
+          <a:fontRef idx="minor">
+            <a:schemeClr val="tx1"/>
+          </a:fontRef>
+        </p:style>
+      </p:cxnSp>
+      <p:cxnSp>
+        <p:nvCxnSpPr>
+          <p:cNvPr id="106" name="Straight Arrow Connector 105">
+            <a:extLst>
+              <a:ext uri="{FF2B5EF4-FFF2-40B4-BE49-F238E27FC236}">
+                <a16:creationId xmlns:a16="http://schemas.microsoft.com/office/drawing/2014/main" id="{1177E82B-0D20-3243-BAFC-A55E5344D465}"/>
+              </a:ext>
+            </a:extLst>
+          </p:cNvPr>
+          <p:cNvCxnSpPr>
+            <a:stCxn id="96" idx="1"/>
+            <a:endCxn id="15" idx="0"/>
+          </p:cNvCxnSpPr>
+          <p:nvPr/>
+        </p:nvCxnSpPr>
+        <p:spPr>
+          <a:xfrm flipH="1">
+            <a:off x="6102476" y="1711426"/>
+            <a:ext cx="9182637" cy="394777"/>
+          </a:xfrm>
+          <a:prstGeom prst="straightConnector1">
+            <a:avLst/>
+          </a:prstGeom>
+          <a:ln w="9525" cap="flat" cmpd="sng" algn="ctr">
+            <a:solidFill>
+              <a:schemeClr val="dk1"/>
+            </a:solidFill>
+            <a:prstDash val="solid"/>
+            <a:round/>
+            <a:headEnd type="none" w="med" len="med"/>
+            <a:tailEnd type="triangle"/>
+          </a:ln>
+        </p:spPr>
+        <p:style>
+          <a:lnRef idx="0">
+            <a:scrgbClr r="0" g="0" b="0"/>
+          </a:lnRef>
+          <a:fillRef idx="0">
+            <a:scrgbClr r="0" g="0" b="0"/>
+          </a:fillRef>
+          <a:effectRef idx="0">
+            <a:scrgbClr r="0" g="0" b="0"/>
+          </a:effectRef>
+          <a:fontRef idx="minor">
+            <a:schemeClr val="tx1"/>
+          </a:fontRef>
+        </p:style>
+      </p:cxnSp>
+      <p:sp>
+        <p:nvSpPr>
+          <p:cNvPr id="111" name="TextBox 110">
+            <a:extLst>
+              <a:ext uri="{FF2B5EF4-FFF2-40B4-BE49-F238E27FC236}">
+                <a16:creationId xmlns:a16="http://schemas.microsoft.com/office/drawing/2014/main" id="{662C254C-0B09-A548-AB28-898B8A9D4B59}"/>
+              </a:ext>
+            </a:extLst>
+          </p:cNvPr>
+          <p:cNvSpPr txBox="1"/>
+          <p:nvPr/>
+        </p:nvSpPr>
+        <p:spPr>
+          <a:xfrm>
+            <a:off x="15285113" y="7781940"/>
+            <a:ext cx="2545249" cy="523220"/>
+          </a:xfrm>
+          <a:prstGeom prst="rect">
+            <a:avLst/>
+          </a:prstGeom>
+        </p:spPr>
+        <p:style>
+          <a:lnRef idx="2">
+            <a:schemeClr val="accent5"/>
+          </a:lnRef>
+          <a:fillRef idx="1">
+            <a:schemeClr val="lt1"/>
+          </a:fillRef>
+          <a:effectRef idx="0">
+            <a:schemeClr val="accent5"/>
+          </a:effectRef>
+          <a:fontRef idx="minor">
+            <a:schemeClr val="dk1"/>
+          </a:fontRef>
+        </p:style>
+        <p:txBody>
+          <a:bodyPr wrap="none" rtlCol="0">
+            <a:spAutoFit/>
+          </a:bodyPr>
+          <a:lstStyle/>
+          <a:p>
+            <a:pPr algn="l"/>
+            <a:r>
+              <a:rPr lang="en-US" sz="1400"/>
+              <a:t>data/sims/</a:t>
+            </a:r>
+          </a:p>
+          <a:p>
+            <a:pPr algn="l"/>
+            <a:r>
+              <a:rPr lang="en-US" sz="1400"/>
+              <a:t>bsed_uniform_bootstraps.Rdata</a:t>
+            </a:r>
+            <a:endParaRPr lang="en-US" sz="1400" dirty="0"/>
+          </a:p>
+        </p:txBody>
+      </p:sp>
+      <p:cxnSp>
+        <p:nvCxnSpPr>
+          <p:cNvPr id="113" name="Straight Arrow Connector 112">
+            <a:extLst>
+              <a:ext uri="{FF2B5EF4-FFF2-40B4-BE49-F238E27FC236}">
+                <a16:creationId xmlns:a16="http://schemas.microsoft.com/office/drawing/2014/main" id="{84543E2A-3EAD-744C-B6C0-4E82F581088E}"/>
+              </a:ext>
+            </a:extLst>
+          </p:cNvPr>
+          <p:cNvCxnSpPr>
+            <a:stCxn id="57" idx="3"/>
+            <a:endCxn id="111" idx="1"/>
+          </p:cNvCxnSpPr>
+          <p:nvPr/>
+        </p:nvCxnSpPr>
+        <p:spPr>
+          <a:xfrm flipV="1">
+            <a:off x="9856037" y="8043550"/>
+            <a:ext cx="5429076" cy="1"/>
+          </a:xfrm>
+          <a:prstGeom prst="straightConnector1">
+            <a:avLst/>
+          </a:prstGeom>
+          <a:ln w="9525" cap="flat" cmpd="sng" algn="ctr">
+            <a:solidFill>
+              <a:schemeClr val="dk1"/>
+            </a:solidFill>
+            <a:prstDash val="solid"/>
+            <a:round/>
+            <a:headEnd type="none" w="med" len="med"/>
+            <a:tailEnd type="triangle"/>
+          </a:ln>
+        </p:spPr>
+        <p:style>
+          <a:lnRef idx="0">
+            <a:scrgbClr r="0" g="0" b="0"/>
+          </a:lnRef>
+          <a:fillRef idx="0">
+            <a:scrgbClr r="0" g="0" b="0"/>
+          </a:fillRef>
+          <a:effectRef idx="0">
+            <a:scrgbClr r="0" g="0" b="0"/>
+          </a:effectRef>
+          <a:fontRef idx="minor">
+            <a:schemeClr val="tx1"/>
+          </a:fontRef>
+        </p:style>
+      </p:cxnSp>
+      <p:sp>
+        <p:nvSpPr>
+          <p:cNvPr id="139" name="TextBox 138">
+            <a:extLst>
+              <a:ext uri="{FF2B5EF4-FFF2-40B4-BE49-F238E27FC236}">
+                <a16:creationId xmlns:a16="http://schemas.microsoft.com/office/drawing/2014/main" id="{5F6166A5-5C93-3E4E-AD90-9A5A93DAC177}"/>
+              </a:ext>
+            </a:extLst>
+          </p:cNvPr>
+          <p:cNvSpPr txBox="1"/>
+          <p:nvPr/>
+        </p:nvSpPr>
+        <p:spPr>
+          <a:xfrm>
+            <a:off x="9508473" y="4426160"/>
+            <a:ext cx="914738" cy="307777"/>
+          </a:xfrm>
+          <a:prstGeom prst="rect">
+            <a:avLst/>
+          </a:prstGeom>
+        </p:spPr>
+        <p:style>
+          <a:lnRef idx="2">
+            <a:schemeClr val="dk1"/>
+          </a:lnRef>
+          <a:fillRef idx="1">
+            <a:schemeClr val="lt1"/>
+          </a:fillRef>
+          <a:effectRef idx="0">
+            <a:schemeClr val="dk1"/>
+          </a:effectRef>
+          <a:fontRef idx="minor">
+            <a:schemeClr val="dk1"/>
+          </a:fontRef>
+        </p:style>
+        <p:txBody>
+          <a:bodyPr wrap="none" rtlCol="0">
+            <a:spAutoFit/>
+          </a:bodyPr>
+          <a:lstStyle/>
+          <a:p>
+            <a:pPr algn="l"/>
+            <a:r>
+              <a:rPr lang="en-US" sz="1400"/>
+              <a:t>plot_bsed</a:t>
+            </a:r>
+            <a:endParaRPr lang="en-US" sz="1400" dirty="0"/>
+          </a:p>
+        </p:txBody>
+      </p:sp>
+      <p:cxnSp>
+        <p:nvCxnSpPr>
+          <p:cNvPr id="141" name="Straight Arrow Connector 140">
+            <a:extLst>
+              <a:ext uri="{FF2B5EF4-FFF2-40B4-BE49-F238E27FC236}">
+                <a16:creationId xmlns:a16="http://schemas.microsoft.com/office/drawing/2014/main" id="{57A71B24-A355-B440-B244-89B86FA0E981}"/>
+              </a:ext>
+            </a:extLst>
+          </p:cNvPr>
+          <p:cNvCxnSpPr>
+            <a:stCxn id="139" idx="2"/>
+            <a:endCxn id="40" idx="0"/>
+          </p:cNvCxnSpPr>
+          <p:nvPr/>
+        </p:nvCxnSpPr>
+        <p:spPr>
+          <a:xfrm>
+            <a:off x="9965842" y="4733937"/>
+            <a:ext cx="1167468" cy="515779"/>
+          </a:xfrm>
+          <a:prstGeom prst="straightConnector1">
+            <a:avLst/>
+          </a:prstGeom>
+          <a:ln w="9525" cap="flat" cmpd="sng" algn="ctr">
+            <a:solidFill>
+              <a:schemeClr val="dk1"/>
+            </a:solidFill>
+            <a:prstDash val="solid"/>
+            <a:round/>
+            <a:headEnd type="none" w="med" len="med"/>
+            <a:tailEnd type="triangle"/>
+          </a:ln>
+        </p:spPr>
+        <p:style>
+          <a:lnRef idx="0">
+            <a:scrgbClr r="0" g="0" b="0"/>
+          </a:lnRef>
+          <a:fillRef idx="0">
+            <a:scrgbClr r="0" g="0" b="0"/>
+          </a:fillRef>
+          <a:effectRef idx="0">
+            <a:scrgbClr r="0" g="0" b="0"/>
+          </a:effectRef>
+          <a:fontRef idx="minor">
+            <a:schemeClr val="tx1"/>
+          </a:fontRef>
+        </p:style>
+      </p:cxnSp>
+      <p:sp>
+        <p:nvSpPr>
+          <p:cNvPr id="142" name="TextBox 141">
+            <a:extLst>
+              <a:ext uri="{FF2B5EF4-FFF2-40B4-BE49-F238E27FC236}">
+                <a16:creationId xmlns:a16="http://schemas.microsoft.com/office/drawing/2014/main" id="{13F75E0A-FCD9-B446-B461-3C04033624EA}"/>
+              </a:ext>
+            </a:extLst>
+          </p:cNvPr>
+          <p:cNvSpPr txBox="1"/>
+          <p:nvPr/>
+        </p:nvSpPr>
+        <p:spPr>
+          <a:xfrm>
+            <a:off x="9508473" y="5757738"/>
+            <a:ext cx="824969" cy="307777"/>
+          </a:xfrm>
+          <a:prstGeom prst="rect">
+            <a:avLst/>
+          </a:prstGeom>
+        </p:spPr>
+        <p:style>
+          <a:lnRef idx="2">
+            <a:schemeClr val="dk1"/>
+          </a:lnRef>
+          <a:fillRef idx="1">
+            <a:schemeClr val="lt1"/>
+          </a:fillRef>
+          <a:effectRef idx="0">
+            <a:schemeClr val="dk1"/>
+          </a:effectRef>
+          <a:fontRef idx="minor">
+            <a:schemeClr val="dk1"/>
+          </a:fontRef>
+        </p:style>
+        <p:txBody>
+          <a:bodyPr wrap="none" rtlCol="0">
+            <a:spAutoFit/>
+          </a:bodyPr>
+          <a:lstStyle/>
+          <a:p>
+            <a:pPr algn="l"/>
+            <a:r>
+              <a:rPr lang="en-US" sz="1400"/>
+              <a:t>plot_bsd</a:t>
+            </a:r>
+            <a:endParaRPr lang="en-US" sz="1400" dirty="0"/>
+          </a:p>
+        </p:txBody>
+      </p:sp>
+      <p:cxnSp>
+        <p:nvCxnSpPr>
+          <p:cNvPr id="144" name="Straight Arrow Connector 143">
+            <a:extLst>
+              <a:ext uri="{FF2B5EF4-FFF2-40B4-BE49-F238E27FC236}">
+                <a16:creationId xmlns:a16="http://schemas.microsoft.com/office/drawing/2014/main" id="{F5418498-257B-134A-B4D6-E2F291C5550D}"/>
+              </a:ext>
+            </a:extLst>
+          </p:cNvPr>
+          <p:cNvCxnSpPr>
+            <a:stCxn id="142" idx="0"/>
+            <a:endCxn id="40" idx="1"/>
+          </p:cNvCxnSpPr>
+          <p:nvPr/>
+        </p:nvCxnSpPr>
+        <p:spPr>
+          <a:xfrm flipV="1">
+            <a:off x="9920958" y="5403605"/>
+            <a:ext cx="502253" cy="354133"/>
+          </a:xfrm>
+          <a:prstGeom prst="straightConnector1">
+            <a:avLst/>
+          </a:prstGeom>
+          <a:ln w="9525" cap="flat" cmpd="sng" algn="ctr">
+            <a:solidFill>
+              <a:schemeClr val="dk1"/>
+            </a:solidFill>
+            <a:prstDash val="solid"/>
+            <a:round/>
+            <a:headEnd type="none" w="med" len="med"/>
+            <a:tailEnd type="triangle"/>
+          </a:ln>
+        </p:spPr>
+        <p:style>
+          <a:lnRef idx="0">
+            <a:scrgbClr r="0" g="0" b="0"/>
+          </a:lnRef>
+          <a:fillRef idx="0">
+            <a:scrgbClr r="0" g="0" b="0"/>
+          </a:fillRef>
+          <a:effectRef idx="0">
+            <a:scrgbClr r="0" g="0" b="0"/>
+          </a:effectRef>
+          <a:fontRef idx="minor">
+            <a:schemeClr val="tx1"/>
+          </a:fontRef>
+        </p:style>
+      </p:cxnSp>
+      <p:sp>
+        <p:nvSpPr>
+          <p:cNvPr id="146" name="TextBox 145">
+            <a:extLst>
+              <a:ext uri="{FF2B5EF4-FFF2-40B4-BE49-F238E27FC236}">
+                <a16:creationId xmlns:a16="http://schemas.microsoft.com/office/drawing/2014/main" id="{4B38C968-B778-544E-99CE-FB33509DD299}"/>
+              </a:ext>
+            </a:extLst>
+          </p:cNvPr>
+          <p:cNvSpPr txBox="1"/>
+          <p:nvPr/>
+        </p:nvSpPr>
+        <p:spPr>
+          <a:xfrm>
+            <a:off x="8907194" y="8630501"/>
+            <a:ext cx="2366161" cy="307777"/>
+          </a:xfrm>
+          <a:prstGeom prst="rect">
+            <a:avLst/>
+          </a:prstGeom>
+        </p:spPr>
+        <p:style>
+          <a:lnRef idx="2">
+            <a:schemeClr val="dk1"/>
+          </a:lnRef>
+          <a:fillRef idx="1">
+            <a:schemeClr val="lt1"/>
+          </a:fillRef>
+          <a:effectRef idx="0">
+            <a:schemeClr val="dk1"/>
+          </a:effectRef>
+          <a:fontRef idx="minor">
+            <a:schemeClr val="dk1"/>
+          </a:fontRef>
+        </p:style>
+        <p:txBody>
+          <a:bodyPr wrap="none" rtlCol="0">
+            <a:spAutoFit/>
+          </a:bodyPr>
+          <a:lstStyle/>
+          <a:p>
+            <a:pPr algn="l"/>
+            <a:r>
+              <a:rPr lang="en-US" sz="1400"/>
+              <a:t>plot_bsed_bootstraps_results</a:t>
+            </a:r>
+            <a:endParaRPr lang="en-US" sz="1400" dirty="0"/>
+          </a:p>
+        </p:txBody>
+      </p:sp>
+      <p:cxnSp>
+        <p:nvCxnSpPr>
+          <p:cNvPr id="148" name="Straight Arrow Connector 147">
+            <a:extLst>
+              <a:ext uri="{FF2B5EF4-FFF2-40B4-BE49-F238E27FC236}">
+                <a16:creationId xmlns:a16="http://schemas.microsoft.com/office/drawing/2014/main" id="{BE21613B-D91A-064F-A9E1-8B30ACA9CC67}"/>
+              </a:ext>
+            </a:extLst>
+          </p:cNvPr>
+          <p:cNvCxnSpPr>
+            <a:stCxn id="57" idx="0"/>
+            <a:endCxn id="40" idx="2"/>
+          </p:cNvCxnSpPr>
+          <p:nvPr/>
+        </p:nvCxnSpPr>
+        <p:spPr>
+          <a:xfrm flipV="1">
+            <a:off x="8799113" y="5557493"/>
+            <a:ext cx="2334197" cy="2332169"/>
+          </a:xfrm>
+          <a:prstGeom prst="straightConnector1">
+            <a:avLst/>
+          </a:prstGeom>
+          <a:ln w="9525" cap="flat" cmpd="sng" algn="ctr">
+            <a:solidFill>
+              <a:schemeClr val="dk1"/>
+            </a:solidFill>
+            <a:prstDash val="solid"/>
+            <a:round/>
+            <a:headEnd type="none" w="med" len="med"/>
+            <a:tailEnd type="triangle"/>
+          </a:ln>
+        </p:spPr>
+        <p:style>
+          <a:lnRef idx="0">
+            <a:scrgbClr r="0" g="0" b="0"/>
+          </a:lnRef>
+          <a:fillRef idx="0">
+            <a:scrgbClr r="0" g="0" b="0"/>
+          </a:fillRef>
+          <a:effectRef idx="0">
+            <a:scrgbClr r="0" g="0" b="0"/>
+          </a:effectRef>
+          <a:fontRef idx="minor">
+            <a:schemeClr val="tx1"/>
+          </a:fontRef>
+        </p:style>
+      </p:cxnSp>
+      <p:cxnSp>
+        <p:nvCxnSpPr>
+          <p:cNvPr id="154" name="Straight Arrow Connector 153">
+            <a:extLst>
+              <a:ext uri="{FF2B5EF4-FFF2-40B4-BE49-F238E27FC236}">
+                <a16:creationId xmlns:a16="http://schemas.microsoft.com/office/drawing/2014/main" id="{27895C1B-D5AB-A342-8220-27CDA80C4431}"/>
+              </a:ext>
+            </a:extLst>
+          </p:cNvPr>
+          <p:cNvCxnSpPr>
+            <a:stCxn id="146" idx="0"/>
+            <a:endCxn id="40" idx="2"/>
+          </p:cNvCxnSpPr>
+          <p:nvPr/>
+        </p:nvCxnSpPr>
+        <p:spPr>
+          <a:xfrm flipV="1">
+            <a:off x="10090275" y="5557493"/>
+            <a:ext cx="1043035" cy="3073008"/>
+          </a:xfrm>
+          <a:prstGeom prst="straightConnector1">
+            <a:avLst/>
+          </a:prstGeom>
+          <a:ln w="9525" cap="flat" cmpd="sng" algn="ctr">
+            <a:solidFill>
+              <a:schemeClr val="dk1"/>
+            </a:solidFill>
+            <a:prstDash val="solid"/>
+            <a:round/>
+            <a:headEnd type="none" w="med" len="med"/>
+            <a:tailEnd type="triangle"/>
+          </a:ln>
+        </p:spPr>
+        <p:style>
+          <a:lnRef idx="0">
+            <a:scrgbClr r="0" g="0" b="0"/>
+          </a:lnRef>
+          <a:fillRef idx="0">
+            <a:scrgbClr r="0" g="0" b="0"/>
+          </a:fillRef>
+          <a:effectRef idx="0">
+            <a:scrgbClr r="0" g="0" b="0"/>
+          </a:effectRef>
+          <a:fontRef idx="minor">
+            <a:schemeClr val="tx1"/>
+          </a:fontRef>
+        </p:style>
+      </p:cxnSp>
+      <p:sp>
+        <p:nvSpPr>
+          <p:cNvPr id="158" name="TextBox 157">
+            <a:extLst>
+              <a:ext uri="{FF2B5EF4-FFF2-40B4-BE49-F238E27FC236}">
+                <a16:creationId xmlns:a16="http://schemas.microsoft.com/office/drawing/2014/main" id="{6C2358E4-CA02-AA4B-8E00-CB8A78ECE4A2}"/>
+              </a:ext>
+            </a:extLst>
+          </p:cNvPr>
+          <p:cNvSpPr txBox="1"/>
+          <p:nvPr/>
+        </p:nvSpPr>
+        <p:spPr>
+          <a:xfrm>
+            <a:off x="12879265" y="7158768"/>
+            <a:ext cx="2432141" cy="307777"/>
+          </a:xfrm>
+          <a:prstGeom prst="rect">
+            <a:avLst/>
+          </a:prstGeom>
+        </p:spPr>
+        <p:style>
+          <a:lnRef idx="2">
+            <a:schemeClr val="accent6"/>
+          </a:lnRef>
+          <a:fillRef idx="1">
+            <a:schemeClr val="lt1"/>
+          </a:fillRef>
+          <a:effectRef idx="0">
+            <a:schemeClr val="accent6"/>
+          </a:effectRef>
+          <a:fontRef idx="minor">
+            <a:schemeClr val="dk1"/>
+          </a:fontRef>
+        </p:style>
+        <p:txBody>
+          <a:bodyPr wrap="none" rtlCol="0">
+            <a:spAutoFit/>
+          </a:bodyPr>
+          <a:lstStyle/>
+          <a:p>
+            <a:pPr algn="l"/>
+            <a:r>
+              <a:rPr lang="en-US" sz="1400" b="1"/>
+              <a:t>bsed_uniform_bootstrap_plot</a:t>
+            </a:r>
+            <a:endParaRPr lang="en-US" sz="1400" b="1" dirty="0"/>
+          </a:p>
+        </p:txBody>
+      </p:sp>
+      <p:cxnSp>
+        <p:nvCxnSpPr>
+          <p:cNvPr id="160" name="Straight Arrow Connector 159">
+            <a:extLst>
+              <a:ext uri="{FF2B5EF4-FFF2-40B4-BE49-F238E27FC236}">
+                <a16:creationId xmlns:a16="http://schemas.microsoft.com/office/drawing/2014/main" id="{BA64EFC3-C011-F64B-B93F-1410A4DB936C}"/>
+              </a:ext>
+            </a:extLst>
+          </p:cNvPr>
+          <p:cNvCxnSpPr>
+            <a:cxnSpLocks/>
+            <a:stCxn id="40" idx="2"/>
+            <a:endCxn id="158" idx="0"/>
+          </p:cNvCxnSpPr>
+          <p:nvPr/>
+        </p:nvCxnSpPr>
+        <p:spPr>
+          <a:xfrm>
+            <a:off x="11133310" y="5557493"/>
+            <a:ext cx="2962026" cy="1601275"/>
+          </a:xfrm>
+          <a:prstGeom prst="straightConnector1">
+            <a:avLst/>
+          </a:prstGeom>
+          <a:ln w="9525" cap="flat" cmpd="sng" algn="ctr">
+            <a:solidFill>
+              <a:schemeClr val="dk1"/>
+            </a:solidFill>
+            <a:prstDash val="solid"/>
+            <a:round/>
+            <a:headEnd type="none" w="med" len="med"/>
+            <a:tailEnd type="triangle"/>
+          </a:ln>
+        </p:spPr>
+        <p:style>
+          <a:lnRef idx="0">
+            <a:scrgbClr r="0" g="0" b="0"/>
+          </a:lnRef>
+          <a:fillRef idx="0">
+            <a:scrgbClr r="0" g="0" b="0"/>
+          </a:fillRef>
+          <a:effectRef idx="0">
+            <a:scrgbClr r="0" g="0" b="0"/>
+          </a:effectRef>
+          <a:fontRef idx="minor">
+            <a:schemeClr val="tx1"/>
+          </a:fontRef>
+        </p:style>
+      </p:cxnSp>
+      <p:sp>
+        <p:nvSpPr>
+          <p:cNvPr id="164" name="TextBox 163">
+            <a:extLst>
+              <a:ext uri="{FF2B5EF4-FFF2-40B4-BE49-F238E27FC236}">
+                <a16:creationId xmlns:a16="http://schemas.microsoft.com/office/drawing/2014/main" id="{4461D73A-6D41-0749-9664-6600B619FC6A}"/>
+              </a:ext>
+            </a:extLst>
+          </p:cNvPr>
+          <p:cNvSpPr txBox="1"/>
+          <p:nvPr/>
+        </p:nvSpPr>
+        <p:spPr>
+          <a:xfrm>
+            <a:off x="3787071" y="9278574"/>
+            <a:ext cx="1962653" cy="307777"/>
+          </a:xfrm>
+          <a:prstGeom prst="rect">
+            <a:avLst/>
+          </a:prstGeom>
+        </p:spPr>
+        <p:style>
+          <a:lnRef idx="2">
+            <a:schemeClr val="dk1"/>
+          </a:lnRef>
+          <a:fillRef idx="1">
+            <a:schemeClr val="lt1"/>
+          </a:fillRef>
+          <a:effectRef idx="0">
+            <a:schemeClr val="dk1"/>
+          </a:effectRef>
+          <a:fontRef idx="minor">
+            <a:schemeClr val="dk1"/>
+          </a:fontRef>
+        </p:style>
+        <p:txBody>
+          <a:bodyPr wrap="none" rtlCol="0">
+            <a:spAutoFit/>
+          </a:bodyPr>
+          <a:lstStyle/>
+          <a:p>
+            <a:pPr algn="l"/>
+            <a:r>
+              <a:rPr lang="en-US" sz="1400"/>
+              <a:t>combine_communities()</a:t>
+            </a:r>
+            <a:endParaRPr lang="en-US" sz="1400" dirty="0"/>
+          </a:p>
+        </p:txBody>
+      </p:sp>
+      <p:cxnSp>
+        <p:nvCxnSpPr>
+          <p:cNvPr id="166" name="Elbow Connector 165">
+            <a:extLst>
+              <a:ext uri="{FF2B5EF4-FFF2-40B4-BE49-F238E27FC236}">
+                <a16:creationId xmlns:a16="http://schemas.microsoft.com/office/drawing/2014/main" id="{E3D0BA11-9588-D249-80F4-4FAD4D4A0798}"/>
+              </a:ext>
+            </a:extLst>
+          </p:cNvPr>
+          <p:cNvCxnSpPr>
+            <a:cxnSpLocks/>
+            <a:stCxn id="17" idx="1"/>
+            <a:endCxn id="164" idx="1"/>
+          </p:cNvCxnSpPr>
+          <p:nvPr/>
+        </p:nvCxnSpPr>
+        <p:spPr>
+          <a:xfrm rot="10800000" flipV="1">
+            <a:off x="3787071" y="2828421"/>
+            <a:ext cx="3955118" cy="6604042"/>
+          </a:xfrm>
+          <a:prstGeom prst="bentConnector3">
+            <a:avLst>
+              <a:gd name="adj1" fmla="val 189935"/>
+            </a:avLst>
+          </a:prstGeom>
+          <a:ln w="9525" cap="flat" cmpd="sng" algn="ctr">
+            <a:solidFill>
+              <a:schemeClr val="dk1"/>
+            </a:solidFill>
+            <a:prstDash val="solid"/>
+            <a:round/>
+            <a:headEnd type="none" w="med" len="med"/>
+            <a:tailEnd type="triangle"/>
+          </a:ln>
+        </p:spPr>
+        <p:style>
+          <a:lnRef idx="0">
+            <a:scrgbClr r="0" g="0" b="0"/>
+          </a:lnRef>
+          <a:fillRef idx="0">
+            <a:scrgbClr r="0" g="0" b="0"/>
+          </a:fillRef>
+          <a:effectRef idx="0">
+            <a:scrgbClr r="0" g="0" b="0"/>
+          </a:effectRef>
+          <a:fontRef idx="minor">
+            <a:schemeClr val="tx1"/>
+          </a:fontRef>
+        </p:style>
+      </p:cxnSp>
+      <p:sp>
+        <p:nvSpPr>
+          <p:cNvPr id="173" name="TextBox 172">
+            <a:extLst>
+              <a:ext uri="{FF2B5EF4-FFF2-40B4-BE49-F238E27FC236}">
+                <a16:creationId xmlns:a16="http://schemas.microsoft.com/office/drawing/2014/main" id="{8C540A95-522F-6546-80CD-1BD80069A18A}"/>
+              </a:ext>
+            </a:extLst>
+          </p:cNvPr>
+          <p:cNvSpPr txBox="1"/>
+          <p:nvPr/>
+        </p:nvSpPr>
+        <p:spPr>
+          <a:xfrm>
+            <a:off x="7732283" y="9278574"/>
+            <a:ext cx="2133661" cy="307777"/>
+          </a:xfrm>
+          <a:prstGeom prst="rect">
+            <a:avLst/>
+          </a:prstGeom>
+        </p:spPr>
+        <p:style>
+          <a:lnRef idx="2">
+            <a:schemeClr val="accent2"/>
+          </a:lnRef>
+          <a:fillRef idx="1">
+            <a:schemeClr val="lt1"/>
+          </a:fillRef>
+          <a:effectRef idx="0">
+            <a:schemeClr val="accent2"/>
+          </a:effectRef>
+          <a:fontRef idx="minor">
+            <a:schemeClr val="dk1"/>
+          </a:fontRef>
+        </p:style>
+        <p:txBody>
+          <a:bodyPr wrap="none" rtlCol="0">
+            <a:spAutoFit/>
+          </a:bodyPr>
+          <a:lstStyle/>
+          <a:p>
+            <a:pPr algn="l"/>
+            <a:r>
+              <a:rPr lang="en-US" sz="1400" b="1"/>
+              <a:t>community_combinations</a:t>
+            </a:r>
+            <a:endParaRPr lang="en-US" sz="1400" b="1" dirty="0"/>
+          </a:p>
+        </p:txBody>
+      </p:sp>
+      <p:cxnSp>
+        <p:nvCxnSpPr>
+          <p:cNvPr id="176" name="Straight Arrow Connector 175">
+            <a:extLst>
+              <a:ext uri="{FF2B5EF4-FFF2-40B4-BE49-F238E27FC236}">
+                <a16:creationId xmlns:a16="http://schemas.microsoft.com/office/drawing/2014/main" id="{795DD7A1-1D25-FC48-89D1-347CDDB368AB}"/>
+              </a:ext>
+            </a:extLst>
+          </p:cNvPr>
+          <p:cNvCxnSpPr>
+            <a:stCxn id="164" idx="3"/>
+            <a:endCxn id="173" idx="1"/>
+          </p:cNvCxnSpPr>
+          <p:nvPr/>
+        </p:nvCxnSpPr>
+        <p:spPr>
+          <a:xfrm>
+            <a:off x="5749724" y="9432463"/>
+            <a:ext cx="1982559" cy="0"/>
+          </a:xfrm>
+          <a:prstGeom prst="straightConnector1">
+            <a:avLst/>
+          </a:prstGeom>
+          <a:ln w="9525" cap="flat" cmpd="sng" algn="ctr">
+            <a:solidFill>
+              <a:schemeClr val="dk1"/>
+            </a:solidFill>
+            <a:prstDash val="solid"/>
+            <a:round/>
+            <a:headEnd type="none" w="med" len="med"/>
+            <a:tailEnd type="triangle"/>
+          </a:ln>
+        </p:spPr>
+        <p:style>
+          <a:lnRef idx="0">
+            <a:scrgbClr r="0" g="0" b="0"/>
+          </a:lnRef>
+          <a:fillRef idx="0">
+            <a:scrgbClr r="0" g="0" b="0"/>
+          </a:fillRef>
+          <a:effectRef idx="0">
+            <a:scrgbClr r="0" g="0" b="0"/>
+          </a:effectRef>
+          <a:fontRef idx="minor">
+            <a:schemeClr val="tx1"/>
+          </a:fontRef>
+        </p:style>
+      </p:cxnSp>
+      <p:cxnSp>
+        <p:nvCxnSpPr>
+          <p:cNvPr id="184" name="Elbow Connector 183">
+            <a:extLst>
+              <a:ext uri="{FF2B5EF4-FFF2-40B4-BE49-F238E27FC236}">
+                <a16:creationId xmlns:a16="http://schemas.microsoft.com/office/drawing/2014/main" id="{94D6A379-9153-6C4E-8F8C-A3243F3538A8}"/>
+              </a:ext>
+            </a:extLst>
+          </p:cNvPr>
+          <p:cNvCxnSpPr>
+            <a:stCxn id="173" idx="2"/>
+            <a:endCxn id="59" idx="2"/>
+          </p:cNvCxnSpPr>
+          <p:nvPr/>
+        </p:nvCxnSpPr>
+        <p:spPr>
+          <a:xfrm rot="5400000" flipH="1">
+            <a:off x="7003335" y="7790572"/>
+            <a:ext cx="650248" cy="2941310"/>
+          </a:xfrm>
+          <a:prstGeom prst="bentConnector3">
+            <a:avLst>
+              <a:gd name="adj1" fmla="val -66093"/>
+            </a:avLst>
+          </a:prstGeom>
+          <a:ln w="9525" cap="flat" cmpd="sng" algn="ctr">
+            <a:solidFill>
+              <a:schemeClr val="dk1"/>
+            </a:solidFill>
+            <a:prstDash val="solid"/>
+            <a:round/>
+            <a:headEnd type="none" w="med" len="med"/>
+            <a:tailEnd type="triangle"/>
+          </a:ln>
+        </p:spPr>
+        <p:style>
+          <a:lnRef idx="0">
+            <a:scrgbClr r="0" g="0" b="0"/>
+          </a:lnRef>
+          <a:fillRef idx="0">
+            <a:scrgbClr r="0" g="0" b="0"/>
+          </a:fillRef>
+          <a:effectRef idx="0">
+            <a:scrgbClr r="0" g="0" b="0"/>
+          </a:effectRef>
+          <a:fontRef idx="minor">
+            <a:schemeClr val="tx1"/>
+          </a:fontRef>
+        </p:style>
+      </p:cxnSp>
+      <p:sp>
+        <p:nvSpPr>
+          <p:cNvPr id="189" name="TextBox 188">
+            <a:extLst>
+              <a:ext uri="{FF2B5EF4-FFF2-40B4-BE49-F238E27FC236}">
+                <a16:creationId xmlns:a16="http://schemas.microsoft.com/office/drawing/2014/main" id="{5CFC977B-EE02-0F46-99F5-8DF05158BE96}"/>
+              </a:ext>
+            </a:extLst>
+          </p:cNvPr>
+          <p:cNvSpPr txBox="1"/>
+          <p:nvPr/>
+        </p:nvSpPr>
+        <p:spPr>
+          <a:xfrm>
+            <a:off x="841943" y="9741704"/>
+            <a:ext cx="2302425" cy="523220"/>
+          </a:xfrm>
+          <a:prstGeom prst="rect">
+            <a:avLst/>
+          </a:prstGeom>
+        </p:spPr>
+        <p:style>
+          <a:lnRef idx="2">
+            <a:schemeClr val="dk1"/>
+          </a:lnRef>
+          <a:fillRef idx="1">
+            <a:schemeClr val="lt1"/>
+          </a:fillRef>
+          <a:effectRef idx="0">
+            <a:schemeClr val="dk1"/>
+          </a:effectRef>
+          <a:fontRef idx="minor">
+            <a:schemeClr val="dk1"/>
+          </a:fontRef>
+        </p:style>
+        <p:txBody>
+          <a:bodyPr wrap="none" rtlCol="0">
+            <a:spAutoFit/>
+          </a:bodyPr>
+          <a:lstStyle/>
+          <a:p>
+            <a:pPr algn="l"/>
+            <a:r>
+              <a:rPr lang="en-US" sz="1400"/>
+              <a:t>bootstrap_crossomm_bseds(</a:t>
+            </a:r>
+          </a:p>
+          <a:p>
+            <a:pPr algn="l"/>
+            <a:r>
+              <a:rPr lang="en-US" sz="1400"/>
+              <a:t>community_dfs)</a:t>
+            </a:r>
+            <a:endParaRPr lang="en-US" sz="1400" dirty="0"/>
+          </a:p>
+        </p:txBody>
+      </p:sp>
+      <p:cxnSp>
+        <p:nvCxnSpPr>
+          <p:cNvPr id="191" name="Elbow Connector 190">
+            <a:extLst>
+              <a:ext uri="{FF2B5EF4-FFF2-40B4-BE49-F238E27FC236}">
+                <a16:creationId xmlns:a16="http://schemas.microsoft.com/office/drawing/2014/main" id="{5363A011-AF2D-6441-B090-FCF20F678535}"/>
+              </a:ext>
+            </a:extLst>
+          </p:cNvPr>
+          <p:cNvCxnSpPr>
+            <a:stCxn id="74" idx="2"/>
+            <a:endCxn id="189" idx="0"/>
+          </p:cNvCxnSpPr>
+          <p:nvPr/>
+        </p:nvCxnSpPr>
+        <p:spPr>
+          <a:xfrm rot="16200000" flipH="1">
+            <a:off x="703765" y="8452312"/>
+            <a:ext cx="1544265" cy="1034517"/>
+          </a:xfrm>
+          <a:prstGeom prst="bentConnector3">
+            <a:avLst/>
+          </a:prstGeom>
+          <a:ln w="9525" cap="flat" cmpd="sng" algn="ctr">
+            <a:solidFill>
+              <a:schemeClr val="dk1"/>
+            </a:solidFill>
+            <a:prstDash val="solid"/>
+            <a:round/>
+            <a:headEnd type="none" w="med" len="med"/>
+            <a:tailEnd type="triangle"/>
+          </a:ln>
+        </p:spPr>
+        <p:style>
+          <a:lnRef idx="0">
+            <a:scrgbClr r="0" g="0" b="0"/>
+          </a:lnRef>
+          <a:fillRef idx="0">
+            <a:scrgbClr r="0" g="0" b="0"/>
+          </a:fillRef>
+          <a:effectRef idx="0">
+            <a:scrgbClr r="0" g="0" b="0"/>
+          </a:effectRef>
+          <a:fontRef idx="minor">
+            <a:schemeClr val="tx1"/>
+          </a:fontRef>
+        </p:style>
+      </p:cxnSp>
+      <p:cxnSp>
+        <p:nvCxnSpPr>
+          <p:cNvPr id="199" name="Elbow Connector 198">
+            <a:extLst>
+              <a:ext uri="{FF2B5EF4-FFF2-40B4-BE49-F238E27FC236}">
+                <a16:creationId xmlns:a16="http://schemas.microsoft.com/office/drawing/2014/main" id="{1A692C09-4DB5-9143-90AB-5CF15C821385}"/>
+              </a:ext>
+            </a:extLst>
+          </p:cNvPr>
+          <p:cNvCxnSpPr>
+            <a:stCxn id="189" idx="3"/>
+            <a:endCxn id="59" idx="2"/>
+          </p:cNvCxnSpPr>
+          <p:nvPr/>
+        </p:nvCxnSpPr>
+        <p:spPr>
+          <a:xfrm flipV="1">
+            <a:off x="3144368" y="8936103"/>
+            <a:ext cx="2713436" cy="1067211"/>
+          </a:xfrm>
+          <a:prstGeom prst="bentConnector2">
+            <a:avLst/>
+          </a:prstGeom>
+          <a:ln w="9525" cap="flat" cmpd="sng" algn="ctr">
+            <a:solidFill>
+              <a:schemeClr val="dk1"/>
+            </a:solidFill>
+            <a:prstDash val="solid"/>
+            <a:round/>
+            <a:headEnd type="none" w="med" len="med"/>
+            <a:tailEnd type="triangle"/>
+          </a:ln>
+        </p:spPr>
+        <p:style>
+          <a:lnRef idx="0">
+            <a:scrgbClr r="0" g="0" b="0"/>
+          </a:lnRef>
+          <a:fillRef idx="0">
+            <a:scrgbClr r="0" g="0" b="0"/>
+          </a:fillRef>
+          <a:effectRef idx="0">
+            <a:scrgbClr r="0" g="0" b="0"/>
+          </a:effectRef>
+          <a:fontRef idx="minor">
+            <a:schemeClr val="tx1"/>
+          </a:fontRef>
+        </p:style>
+      </p:cxnSp>
+      <p:sp>
+        <p:nvSpPr>
+          <p:cNvPr id="203" name="TextBox 202">
+            <a:extLst>
+              <a:ext uri="{FF2B5EF4-FFF2-40B4-BE49-F238E27FC236}">
+                <a16:creationId xmlns:a16="http://schemas.microsoft.com/office/drawing/2014/main" id="{9A4F78AA-E5C5-5A4C-9CAD-46913328E6B4}"/>
+              </a:ext>
+            </a:extLst>
+          </p:cNvPr>
+          <p:cNvSpPr txBox="1"/>
+          <p:nvPr/>
+        </p:nvSpPr>
+        <p:spPr>
+          <a:xfrm>
+            <a:off x="7738688" y="10359709"/>
+            <a:ext cx="2357120" cy="307777"/>
+          </a:xfrm>
+          <a:prstGeom prst="rect">
+            <a:avLst/>
+          </a:prstGeom>
+        </p:spPr>
+        <p:style>
+          <a:lnRef idx="2">
+            <a:schemeClr val="accent2"/>
+          </a:lnRef>
+          <a:fillRef idx="1">
+            <a:schemeClr val="lt1"/>
+          </a:fillRef>
+          <a:effectRef idx="0">
+            <a:schemeClr val="accent2"/>
+          </a:effectRef>
+          <a:fontRef idx="minor">
+            <a:schemeClr val="dk1"/>
+          </a:fontRef>
+        </p:style>
+        <p:txBody>
+          <a:bodyPr wrap="none" rtlCol="0">
+            <a:spAutoFit/>
+          </a:bodyPr>
+          <a:lstStyle/>
+          <a:p>
+            <a:pPr algn="l"/>
+            <a:r>
+              <a:rPr lang="en-US" sz="1400" b="1"/>
+              <a:t>bsed_crosscomm_bootstraps</a:t>
+            </a:r>
+            <a:endParaRPr lang="en-US" sz="1400" b="1" dirty="0"/>
+          </a:p>
+        </p:txBody>
+      </p:sp>
+      <p:cxnSp>
+        <p:nvCxnSpPr>
+          <p:cNvPr id="207" name="Straight Arrow Connector 206">
+            <a:extLst>
+              <a:ext uri="{FF2B5EF4-FFF2-40B4-BE49-F238E27FC236}">
+                <a16:creationId xmlns:a16="http://schemas.microsoft.com/office/drawing/2014/main" id="{DB90ECAE-99AD-AE4A-8DE6-4B7812AB0245}"/>
+              </a:ext>
+            </a:extLst>
+          </p:cNvPr>
+          <p:cNvCxnSpPr>
+            <a:stCxn id="59" idx="2"/>
+          </p:cNvCxnSpPr>
+          <p:nvPr/>
+        </p:nvCxnSpPr>
+        <p:spPr>
+          <a:xfrm>
+            <a:off x="5857804" y="8936103"/>
+            <a:ext cx="1892278" cy="1577494"/>
+          </a:xfrm>
+          <a:prstGeom prst="straightConnector1">
+            <a:avLst/>
+          </a:prstGeom>
+          <a:ln w="9525" cap="flat" cmpd="sng" algn="ctr">
+            <a:solidFill>
+              <a:schemeClr val="dk1"/>
+            </a:solidFill>
+            <a:prstDash val="solid"/>
+            <a:round/>
+            <a:headEnd type="none" w="med" len="med"/>
+            <a:tailEnd type="triangle"/>
+          </a:ln>
+        </p:spPr>
+        <p:style>
+          <a:lnRef idx="0">
+            <a:scrgbClr r="0" g="0" b="0"/>
+          </a:lnRef>
+          <a:fillRef idx="0">
+            <a:scrgbClr r="0" g="0" b="0"/>
+          </a:fillRef>
+          <a:effectRef idx="0">
+            <a:scrgbClr r="0" g="0" b="0"/>
+          </a:effectRef>
+          <a:fontRef idx="minor">
+            <a:schemeClr val="tx1"/>
+          </a:fontRef>
+        </p:style>
+      </p:cxnSp>
+      <p:sp>
+        <p:nvSpPr>
+          <p:cNvPr id="208" name="TextBox 207">
+            <a:extLst>
+              <a:ext uri="{FF2B5EF4-FFF2-40B4-BE49-F238E27FC236}">
+                <a16:creationId xmlns:a16="http://schemas.microsoft.com/office/drawing/2014/main" id="{7BE12993-511B-D34D-B1C0-8620786BCD49}"/>
+              </a:ext>
+            </a:extLst>
+          </p:cNvPr>
+          <p:cNvSpPr txBox="1"/>
+          <p:nvPr/>
+        </p:nvSpPr>
+        <p:spPr>
+          <a:xfrm>
+            <a:off x="15285113" y="10251987"/>
+            <a:ext cx="2788327" cy="523220"/>
+          </a:xfrm>
+          <a:prstGeom prst="rect">
+            <a:avLst/>
+          </a:prstGeom>
+        </p:spPr>
+        <p:style>
+          <a:lnRef idx="2">
+            <a:schemeClr val="accent5"/>
+          </a:lnRef>
+          <a:fillRef idx="1">
+            <a:schemeClr val="lt1"/>
+          </a:fillRef>
+          <a:effectRef idx="0">
+            <a:schemeClr val="accent5"/>
+          </a:effectRef>
+          <a:fontRef idx="minor">
+            <a:schemeClr val="dk1"/>
+          </a:fontRef>
+        </p:style>
+        <p:txBody>
+          <a:bodyPr wrap="none" rtlCol="0">
+            <a:spAutoFit/>
+          </a:bodyPr>
+          <a:lstStyle/>
+          <a:p>
+            <a:pPr algn="l"/>
+            <a:r>
+              <a:rPr lang="en-US" sz="1400"/>
+              <a:t>data/sims/</a:t>
+            </a:r>
+          </a:p>
+          <a:p>
+            <a:pPr algn="l"/>
+            <a:r>
+              <a:rPr lang="en-US" sz="1400"/>
+              <a:t>bsed_crosscomm_bootstraps.Rdata</a:t>
+            </a:r>
+            <a:endParaRPr lang="en-US" sz="1400" dirty="0"/>
+          </a:p>
+        </p:txBody>
+      </p:sp>
+      <p:cxnSp>
+        <p:nvCxnSpPr>
+          <p:cNvPr id="210" name="Straight Arrow Connector 209">
+            <a:extLst>
+              <a:ext uri="{FF2B5EF4-FFF2-40B4-BE49-F238E27FC236}">
+                <a16:creationId xmlns:a16="http://schemas.microsoft.com/office/drawing/2014/main" id="{7D16606F-D4A6-BD45-8034-097D027DEC61}"/>
+              </a:ext>
+            </a:extLst>
+          </p:cNvPr>
+          <p:cNvCxnSpPr>
+            <a:stCxn id="203" idx="3"/>
+            <a:endCxn id="208" idx="1"/>
+          </p:cNvCxnSpPr>
+          <p:nvPr/>
+        </p:nvCxnSpPr>
+        <p:spPr>
+          <a:xfrm flipV="1">
+            <a:off x="10095808" y="10513597"/>
+            <a:ext cx="5189305" cy="1"/>
+          </a:xfrm>
+          <a:prstGeom prst="straightConnector1">
+            <a:avLst/>
+          </a:prstGeom>
+          <a:ln w="9525" cap="flat" cmpd="sng" algn="ctr">
+            <a:solidFill>
+              <a:schemeClr val="dk1"/>
+            </a:solidFill>
+            <a:prstDash val="solid"/>
+            <a:round/>
+            <a:headEnd type="none" w="med" len="med"/>
+            <a:tailEnd type="triangle"/>
+          </a:ln>
+        </p:spPr>
+        <p:style>
+          <a:lnRef idx="0">
+            <a:scrgbClr r="0" g="0" b="0"/>
+          </a:lnRef>
+          <a:fillRef idx="0">
+            <a:scrgbClr r="0" g="0" b="0"/>
+          </a:fillRef>
+          <a:effectRef idx="0">
+            <a:scrgbClr r="0" g="0" b="0"/>
+          </a:effectRef>
+          <a:fontRef idx="minor">
+            <a:schemeClr val="tx1"/>
+          </a:fontRef>
+        </p:style>
+      </p:cxnSp>
+      <p:sp>
+        <p:nvSpPr>
+          <p:cNvPr id="211" name="TextBox 210">
+            <a:extLst>
+              <a:ext uri="{FF2B5EF4-FFF2-40B4-BE49-F238E27FC236}">
+                <a16:creationId xmlns:a16="http://schemas.microsoft.com/office/drawing/2014/main" id="{6F17D28D-7305-7A4A-95EF-6EF62E0B202E}"/>
+              </a:ext>
+            </a:extLst>
+          </p:cNvPr>
+          <p:cNvSpPr txBox="1"/>
+          <p:nvPr/>
+        </p:nvSpPr>
+        <p:spPr>
+          <a:xfrm>
+            <a:off x="10423211" y="11136011"/>
+            <a:ext cx="1899431" cy="307777"/>
+          </a:xfrm>
+          <a:prstGeom prst="rect">
+            <a:avLst/>
+          </a:prstGeom>
+        </p:spPr>
+        <p:style>
+          <a:lnRef idx="2">
+            <a:schemeClr val="dk1"/>
+          </a:lnRef>
+          <a:fillRef idx="1">
+            <a:schemeClr val="lt1"/>
+          </a:fillRef>
+          <a:effectRef idx="0">
+            <a:schemeClr val="dk1"/>
+          </a:effectRef>
+          <a:fontRef idx="minor">
+            <a:schemeClr val="dk1"/>
+          </a:fontRef>
+        </p:style>
+        <p:txBody>
+          <a:bodyPr wrap="none" rtlCol="0">
+            <a:spAutoFit/>
+          </a:bodyPr>
+          <a:lstStyle/>
+          <a:p>
+            <a:pPr algn="l"/>
+            <a:r>
+              <a:rPr lang="en-US" sz="1400"/>
+              <a:t>plot_crosscomm_bseds</a:t>
+            </a:r>
+            <a:endParaRPr lang="en-US" sz="1400" dirty="0"/>
+          </a:p>
+        </p:txBody>
+      </p:sp>
+      <p:cxnSp>
+        <p:nvCxnSpPr>
+          <p:cNvPr id="218" name="Straight Arrow Connector 217">
+            <a:extLst>
+              <a:ext uri="{FF2B5EF4-FFF2-40B4-BE49-F238E27FC236}">
+                <a16:creationId xmlns:a16="http://schemas.microsoft.com/office/drawing/2014/main" id="{88EF5D5F-BB05-6440-B075-121C0FED2DC1}"/>
+              </a:ext>
+            </a:extLst>
+          </p:cNvPr>
+          <p:cNvCxnSpPr>
+            <a:stCxn id="146" idx="2"/>
+            <a:endCxn id="211" idx="0"/>
+          </p:cNvCxnSpPr>
+          <p:nvPr/>
+        </p:nvCxnSpPr>
+        <p:spPr>
+          <a:xfrm>
+            <a:off x="10090275" y="8938278"/>
+            <a:ext cx="1282652" cy="2197733"/>
+          </a:xfrm>
+          <a:prstGeom prst="straightConnector1">
+            <a:avLst/>
+          </a:prstGeom>
+          <a:ln w="9525" cap="flat" cmpd="sng" algn="ctr">
+            <a:solidFill>
+              <a:schemeClr val="dk1"/>
+            </a:solidFill>
+            <a:prstDash val="solid"/>
+            <a:round/>
+            <a:headEnd type="none" w="med" len="med"/>
+            <a:tailEnd type="triangle"/>
+          </a:ln>
+        </p:spPr>
+        <p:style>
+          <a:lnRef idx="0">
+            <a:scrgbClr r="0" g="0" b="0"/>
+          </a:lnRef>
+          <a:fillRef idx="0">
+            <a:scrgbClr r="0" g="0" b="0"/>
+          </a:fillRef>
+          <a:effectRef idx="0">
+            <a:scrgbClr r="0" g="0" b="0"/>
+          </a:effectRef>
+          <a:fontRef idx="minor">
+            <a:schemeClr val="tx1"/>
+          </a:fontRef>
+        </p:style>
+      </p:cxnSp>
+      <p:cxnSp>
+        <p:nvCxnSpPr>
+          <p:cNvPr id="220" name="Straight Arrow Connector 219">
+            <a:extLst>
+              <a:ext uri="{FF2B5EF4-FFF2-40B4-BE49-F238E27FC236}">
+                <a16:creationId xmlns:a16="http://schemas.microsoft.com/office/drawing/2014/main" id="{4CE1795D-C350-794C-A277-6BF331176DE0}"/>
+              </a:ext>
+            </a:extLst>
+          </p:cNvPr>
+          <p:cNvCxnSpPr>
+            <a:stCxn id="203" idx="3"/>
+            <a:endCxn id="211" idx="0"/>
+          </p:cNvCxnSpPr>
+          <p:nvPr/>
+        </p:nvCxnSpPr>
+        <p:spPr>
+          <a:xfrm>
+            <a:off x="10095808" y="10513598"/>
+            <a:ext cx="1277119" cy="622413"/>
+          </a:xfrm>
+          <a:prstGeom prst="straightConnector1">
+            <a:avLst/>
+          </a:prstGeom>
+          <a:ln w="9525" cap="flat" cmpd="sng" algn="ctr">
+            <a:solidFill>
+              <a:schemeClr val="dk1"/>
+            </a:solidFill>
+            <a:prstDash val="solid"/>
+            <a:round/>
+            <a:headEnd type="none" w="med" len="med"/>
+            <a:tailEnd type="triangle"/>
+          </a:ln>
+        </p:spPr>
+        <p:style>
+          <a:lnRef idx="0">
+            <a:scrgbClr r="0" g="0" b="0"/>
+          </a:lnRef>
+          <a:fillRef idx="0">
+            <a:scrgbClr r="0" g="0" b="0"/>
+          </a:fillRef>
+          <a:effectRef idx="0">
+            <a:scrgbClr r="0" g="0" b="0"/>
+          </a:effectRef>
+          <a:fontRef idx="minor">
+            <a:schemeClr val="tx1"/>
+          </a:fontRef>
+        </p:style>
+      </p:cxnSp>
+      <p:sp>
+        <p:nvSpPr>
+          <p:cNvPr id="223" name="TextBox 222">
+            <a:extLst>
+              <a:ext uri="{FF2B5EF4-FFF2-40B4-BE49-F238E27FC236}">
+                <a16:creationId xmlns:a16="http://schemas.microsoft.com/office/drawing/2014/main" id="{F7284E17-162E-AD4B-9B1B-7F7F6D5B45C0}"/>
+              </a:ext>
+            </a:extLst>
+          </p:cNvPr>
+          <p:cNvSpPr txBox="1"/>
+          <p:nvPr/>
+        </p:nvSpPr>
+        <p:spPr>
+          <a:xfrm>
+            <a:off x="12618720" y="11539728"/>
+            <a:ext cx="2232278" cy="307777"/>
+          </a:xfrm>
+          <a:prstGeom prst="rect">
+            <a:avLst/>
+          </a:prstGeom>
+        </p:spPr>
+        <p:style>
+          <a:lnRef idx="2">
+            <a:schemeClr val="accent6"/>
+          </a:lnRef>
+          <a:fillRef idx="1">
+            <a:schemeClr val="lt1"/>
+          </a:fillRef>
+          <a:effectRef idx="0">
+            <a:schemeClr val="accent6"/>
+          </a:effectRef>
+          <a:fontRef idx="minor">
+            <a:schemeClr val="dk1"/>
+          </a:fontRef>
+        </p:style>
+        <p:txBody>
+          <a:bodyPr wrap="none" rtlCol="0">
+            <a:spAutoFit/>
+          </a:bodyPr>
+          <a:lstStyle/>
+          <a:p>
+            <a:pPr algn="l"/>
+            <a:r>
+              <a:rPr lang="en-US" sz="1400" b="1"/>
+              <a:t>crosscomm_bootstrap_plot</a:t>
+            </a:r>
+            <a:endParaRPr lang="en-US" sz="1400" b="1" dirty="0"/>
+          </a:p>
+        </p:txBody>
+      </p:sp>
+      <p:cxnSp>
+        <p:nvCxnSpPr>
+          <p:cNvPr id="225" name="Straight Arrow Connector 224">
+            <a:extLst>
+              <a:ext uri="{FF2B5EF4-FFF2-40B4-BE49-F238E27FC236}">
+                <a16:creationId xmlns:a16="http://schemas.microsoft.com/office/drawing/2014/main" id="{46CEFCC6-380E-294C-B459-3A8CF1FF8354}"/>
+              </a:ext>
+            </a:extLst>
+          </p:cNvPr>
+          <p:cNvCxnSpPr>
+            <a:stCxn id="211" idx="3"/>
+            <a:endCxn id="223" idx="0"/>
+          </p:cNvCxnSpPr>
+          <p:nvPr/>
+        </p:nvCxnSpPr>
+        <p:spPr>
+          <a:xfrm>
+            <a:off x="12322642" y="11289900"/>
+            <a:ext cx="1412217" cy="249828"/>
+          </a:xfrm>
+          <a:prstGeom prst="straightConnector1">
+            <a:avLst/>
+          </a:prstGeom>
+          <a:ln w="9525" cap="flat" cmpd="sng" algn="ctr">
+            <a:solidFill>
+              <a:schemeClr val="dk1"/>
+            </a:solidFill>
+            <a:prstDash val="solid"/>
+            <a:round/>
+            <a:headEnd type="none" w="med" len="med"/>
+            <a:tailEnd type="triangle"/>
+          </a:ln>
+        </p:spPr>
+        <p:style>
+          <a:lnRef idx="0">
+            <a:scrgbClr r="0" g="0" b="0"/>
+          </a:lnRef>
+          <a:fillRef idx="0">
+            <a:scrgbClr r="0" g="0" b="0"/>
+          </a:fillRef>
+          <a:effectRef idx="0">
+            <a:scrgbClr r="0" g="0" b="0"/>
+          </a:effectRef>
+          <a:fontRef idx="minor">
+            <a:schemeClr val="tx1"/>
+          </a:fontRef>
+        </p:style>
+      </p:cxnSp>
+      <p:sp>
+        <p:nvSpPr>
+          <p:cNvPr id="226" name="TextBox 225">
+            <a:extLst>
+              <a:ext uri="{FF2B5EF4-FFF2-40B4-BE49-F238E27FC236}">
+                <a16:creationId xmlns:a16="http://schemas.microsoft.com/office/drawing/2014/main" id="{F9FA7D20-3C9A-084F-BDF3-93444E6A5A76}"/>
+              </a:ext>
+            </a:extLst>
+          </p:cNvPr>
+          <p:cNvSpPr txBox="1"/>
+          <p:nvPr/>
+        </p:nvSpPr>
+        <p:spPr>
+          <a:xfrm>
+            <a:off x="10423211" y="12414258"/>
+            <a:ext cx="1741631" cy="307777"/>
+          </a:xfrm>
+          <a:prstGeom prst="rect">
+            <a:avLst/>
+          </a:prstGeom>
+        </p:spPr>
+        <p:style>
+          <a:lnRef idx="2">
+            <a:schemeClr val="dk1"/>
+          </a:lnRef>
+          <a:fillRef idx="1">
+            <a:schemeClr val="lt1"/>
+          </a:fillRef>
+          <a:effectRef idx="0">
+            <a:schemeClr val="dk1"/>
+          </a:effectRef>
+          <a:fontRef idx="minor">
+            <a:schemeClr val="dk1"/>
+          </a:fontRef>
+        </p:style>
+        <p:txBody>
+          <a:bodyPr wrap="none" rtlCol="0">
+            <a:spAutoFit/>
+          </a:bodyPr>
+          <a:lstStyle/>
+          <a:p>
+            <a:pPr algn="l"/>
+            <a:r>
+              <a:rPr lang="en-US" sz="1400"/>
+              <a:t>plot_bootstrap_pvals</a:t>
+            </a:r>
+            <a:endParaRPr lang="en-US" sz="1400" dirty="0"/>
+          </a:p>
+        </p:txBody>
+      </p:sp>
+      <p:cxnSp>
+        <p:nvCxnSpPr>
+          <p:cNvPr id="228" name="Straight Arrow Connector 227">
+            <a:extLst>
+              <a:ext uri="{FF2B5EF4-FFF2-40B4-BE49-F238E27FC236}">
+                <a16:creationId xmlns:a16="http://schemas.microsoft.com/office/drawing/2014/main" id="{0D8A4E15-0F6C-FA4C-B351-946A5F036084}"/>
+              </a:ext>
+            </a:extLst>
+          </p:cNvPr>
+          <p:cNvCxnSpPr>
+            <a:stCxn id="203" idx="2"/>
+            <a:endCxn id="226" idx="1"/>
+          </p:cNvCxnSpPr>
+          <p:nvPr/>
+        </p:nvCxnSpPr>
+        <p:spPr>
+          <a:xfrm>
+            <a:off x="8917248" y="10667486"/>
+            <a:ext cx="1505963" cy="1900661"/>
+          </a:xfrm>
+          <a:prstGeom prst="straightConnector1">
+            <a:avLst/>
+          </a:prstGeom>
+          <a:ln w="9525" cap="flat" cmpd="sng" algn="ctr">
+            <a:solidFill>
+              <a:schemeClr val="dk1"/>
+            </a:solidFill>
+            <a:prstDash val="solid"/>
+            <a:round/>
+            <a:headEnd type="none" w="med" len="med"/>
+            <a:tailEnd type="triangle"/>
+          </a:ln>
+        </p:spPr>
+        <p:style>
+          <a:lnRef idx="0">
+            <a:scrgbClr r="0" g="0" b="0"/>
+          </a:lnRef>
+          <a:fillRef idx="0">
+            <a:scrgbClr r="0" g="0" b="0"/>
+          </a:fillRef>
+          <a:effectRef idx="0">
+            <a:scrgbClr r="0" g="0" b="0"/>
+          </a:effectRef>
+          <a:fontRef idx="minor">
+            <a:schemeClr val="tx1"/>
+          </a:fontRef>
+        </p:style>
+      </p:cxnSp>
+      <p:sp>
+        <p:nvSpPr>
+          <p:cNvPr id="229" name="TextBox 228">
+            <a:extLst>
+              <a:ext uri="{FF2B5EF4-FFF2-40B4-BE49-F238E27FC236}">
+                <a16:creationId xmlns:a16="http://schemas.microsoft.com/office/drawing/2014/main" id="{A8B8AADB-61E2-3140-94C1-610359E60A45}"/>
+              </a:ext>
+            </a:extLst>
+          </p:cNvPr>
+          <p:cNvSpPr txBox="1"/>
+          <p:nvPr/>
+        </p:nvSpPr>
+        <p:spPr>
+          <a:xfrm>
+            <a:off x="8185811" y="12414257"/>
+            <a:ext cx="1406091" cy="307777"/>
+          </a:xfrm>
+          <a:prstGeom prst="rect">
+            <a:avLst/>
+          </a:prstGeom>
+        </p:spPr>
+        <p:style>
+          <a:lnRef idx="2">
+            <a:schemeClr val="dk1"/>
+          </a:lnRef>
+          <a:fillRef idx="1">
+            <a:schemeClr val="lt1"/>
+          </a:fillRef>
+          <a:effectRef idx="0">
+            <a:schemeClr val="dk1"/>
+          </a:effectRef>
+          <a:fontRef idx="minor">
+            <a:schemeClr val="dk1"/>
+          </a:fontRef>
+        </p:style>
+        <p:txBody>
+          <a:bodyPr wrap="none" rtlCol="0">
+            <a:spAutoFit/>
+          </a:bodyPr>
+          <a:lstStyle/>
+          <a:p>
+            <a:pPr algn="l"/>
+            <a:r>
+              <a:rPr lang="en-US" sz="1400"/>
+              <a:t>get_bootstrap_p</a:t>
+            </a:r>
+            <a:endParaRPr lang="en-US" sz="1400" dirty="0"/>
+          </a:p>
+        </p:txBody>
+      </p:sp>
+      <p:cxnSp>
+        <p:nvCxnSpPr>
+          <p:cNvPr id="231" name="Straight Arrow Connector 230">
+            <a:extLst>
+              <a:ext uri="{FF2B5EF4-FFF2-40B4-BE49-F238E27FC236}">
+                <a16:creationId xmlns:a16="http://schemas.microsoft.com/office/drawing/2014/main" id="{4D2A461C-E098-964F-9759-4995E7F7AD56}"/>
+              </a:ext>
+            </a:extLst>
+          </p:cNvPr>
+          <p:cNvCxnSpPr>
+            <a:cxnSpLocks/>
+            <a:stCxn id="229" idx="3"/>
+            <a:endCxn id="226" idx="1"/>
+          </p:cNvCxnSpPr>
+          <p:nvPr/>
+        </p:nvCxnSpPr>
+        <p:spPr>
+          <a:xfrm>
+            <a:off x="9591902" y="12568146"/>
+            <a:ext cx="831309" cy="1"/>
+          </a:xfrm>
+          <a:prstGeom prst="straightConnector1">
+            <a:avLst/>
+          </a:prstGeom>
+          <a:ln w="9525" cap="flat" cmpd="sng" algn="ctr">
+            <a:solidFill>
+              <a:schemeClr val="dk1"/>
+            </a:solidFill>
+            <a:prstDash val="solid"/>
+            <a:round/>
+            <a:headEnd type="none" w="med" len="med"/>
+            <a:tailEnd type="triangle"/>
+          </a:ln>
+        </p:spPr>
+        <p:style>
+          <a:lnRef idx="0">
+            <a:scrgbClr r="0" g="0" b="0"/>
+          </a:lnRef>
+          <a:fillRef idx="0">
+            <a:scrgbClr r="0" g="0" b="0"/>
+          </a:fillRef>
+          <a:effectRef idx="0">
+            <a:scrgbClr r="0" g="0" b="0"/>
+          </a:effectRef>
+          <a:fontRef idx="minor">
+            <a:schemeClr val="tx1"/>
+          </a:fontRef>
+        </p:style>
+      </p:cxnSp>
+      <p:sp>
+        <p:nvSpPr>
+          <p:cNvPr id="233" name="TextBox 232">
+            <a:extLst>
+              <a:ext uri="{FF2B5EF4-FFF2-40B4-BE49-F238E27FC236}">
+                <a16:creationId xmlns:a16="http://schemas.microsoft.com/office/drawing/2014/main" id="{214BF57F-FD13-1F41-9E50-A1B7AD4CBAEF}"/>
+              </a:ext>
+            </a:extLst>
+          </p:cNvPr>
+          <p:cNvSpPr txBox="1"/>
+          <p:nvPr/>
+        </p:nvSpPr>
+        <p:spPr>
+          <a:xfrm>
+            <a:off x="12676837" y="12411969"/>
+            <a:ext cx="1404552" cy="307777"/>
+          </a:xfrm>
+          <a:prstGeom prst="rect">
+            <a:avLst/>
+          </a:prstGeom>
+        </p:spPr>
+        <p:style>
+          <a:lnRef idx="2">
+            <a:schemeClr val="accent6"/>
+          </a:lnRef>
+          <a:fillRef idx="1">
+            <a:schemeClr val="lt1"/>
+          </a:fillRef>
+          <a:effectRef idx="0">
+            <a:schemeClr val="accent6"/>
+          </a:effectRef>
+          <a:fontRef idx="minor">
+            <a:schemeClr val="dk1"/>
+          </a:fontRef>
+        </p:style>
+        <p:txBody>
+          <a:bodyPr wrap="none" rtlCol="0">
+            <a:spAutoFit/>
+          </a:bodyPr>
+          <a:lstStyle/>
+          <a:p>
+            <a:pPr algn="l"/>
+            <a:r>
+              <a:rPr lang="en-US" sz="1400" b="1"/>
+              <a:t>pvals_histogram</a:t>
+            </a:r>
+            <a:endParaRPr lang="en-US" sz="1400" b="1" dirty="0"/>
+          </a:p>
+        </p:txBody>
+      </p:sp>
+      <p:cxnSp>
+        <p:nvCxnSpPr>
+          <p:cNvPr id="235" name="Straight Arrow Connector 234">
+            <a:extLst>
+              <a:ext uri="{FF2B5EF4-FFF2-40B4-BE49-F238E27FC236}">
+                <a16:creationId xmlns:a16="http://schemas.microsoft.com/office/drawing/2014/main" id="{FA8BB0A1-12C4-5342-9C9A-1418881212D5}"/>
+              </a:ext>
+            </a:extLst>
+          </p:cNvPr>
+          <p:cNvCxnSpPr>
+            <a:stCxn id="226" idx="3"/>
+            <a:endCxn id="233" idx="1"/>
+          </p:cNvCxnSpPr>
+          <p:nvPr/>
+        </p:nvCxnSpPr>
+        <p:spPr>
+          <a:xfrm flipV="1">
+            <a:off x="12164842" y="12565858"/>
+            <a:ext cx="511995" cy="2289"/>
           </a:xfrm>
           <a:prstGeom prst="straightConnector1">
             <a:avLst/>
@@ -4995,4 +8467,299 @@
     </a:ext>
   </a:extLst>
 </a:theme>
+</file>
+
+<file path=ppt/theme/theme2.xml><?xml version="1.0" encoding="utf-8"?>
+<a:theme xmlns:a="http://schemas.openxmlformats.org/drawingml/2006/main" name="Office Theme">
+  <a:themeElements>
+    <a:clrScheme name="Office">
+      <a:dk1>
+        <a:sysClr val="windowText" lastClr="000000"/>
+      </a:dk1>
+      <a:lt1>
+        <a:sysClr val="window" lastClr="FFFFFF"/>
+      </a:lt1>
+      <a:dk2>
+        <a:srgbClr val="44546A"/>
+      </a:dk2>
+      <a:lt2>
+        <a:srgbClr val="E7E6E6"/>
+      </a:lt2>
+      <a:accent1>
+        <a:srgbClr val="4472C4"/>
+      </a:accent1>
+      <a:accent2>
+        <a:srgbClr val="ED7D31"/>
+      </a:accent2>
+      <a:accent3>
+        <a:srgbClr val="A5A5A5"/>
+      </a:accent3>
+      <a:accent4>
+        <a:srgbClr val="FFC000"/>
+      </a:accent4>
+      <a:accent5>
+        <a:srgbClr val="5B9BD5"/>
+      </a:accent5>
+      <a:accent6>
+        <a:srgbClr val="70AD47"/>
+      </a:accent6>
+      <a:hlink>
+        <a:srgbClr val="0563C1"/>
+      </a:hlink>
+      <a:folHlink>
+        <a:srgbClr val="954F72"/>
+      </a:folHlink>
+    </a:clrScheme>
+    <a:fontScheme name="Office">
+      <a:majorFont>
+        <a:latin typeface="Calibri Light" panose="020F0302020204030204"/>
+        <a:ea typeface=""/>
+        <a:cs typeface=""/>
+        <a:font script="Jpan" typeface="游ゴシック Light"/>
+        <a:font script="Hang" typeface="맑은 고딕"/>
+        <a:font script="Hans" typeface="等线 Light"/>
+        <a:font script="Hant" typeface="新細明體"/>
+        <a:font script="Arab" typeface="Times New Roman"/>
+        <a:font script="Hebr" typeface="Times New Roman"/>
+        <a:font script="Thai" typeface="Angsana New"/>
+        <a:font script="Ethi" typeface="Nyala"/>
+        <a:font script="Beng" typeface="Vrinda"/>
+        <a:font script="Gujr" typeface="Shruti"/>
+        <a:font script="Khmr" typeface="MoolBoran"/>
+        <a:font script="Knda" typeface="Tunga"/>
+        <a:font script="Guru" typeface="Raavi"/>
+        <a:font script="Cans" typeface="Euphemia"/>
+        <a:font script="Cher" typeface="Plantagenet Cherokee"/>
+        <a:font script="Yiii" typeface="Microsoft Yi Baiti"/>
+        <a:font script="Tibt" typeface="Microsoft Himalaya"/>
+        <a:font script="Thaa" typeface="MV Boli"/>
+        <a:font script="Deva" typeface="Mangal"/>
+        <a:font script="Telu" typeface="Gautami"/>
+        <a:font script="Taml" typeface="Latha"/>
+        <a:font script="Syrc" typeface="Estrangelo Edessa"/>
+        <a:font script="Orya" typeface="Kalinga"/>
+        <a:font script="Mlym" typeface="Kartika"/>
+        <a:font script="Laoo" typeface="DokChampa"/>
+        <a:font script="Sinh" typeface="Iskoola Pota"/>
+        <a:font script="Mong" typeface="Mongolian Baiti"/>
+        <a:font script="Viet" typeface="Times New Roman"/>
+        <a:font script="Uigh" typeface="Microsoft Uighur"/>
+        <a:font script="Geor" typeface="Sylfaen"/>
+        <a:font script="Armn" typeface="Arial"/>
+        <a:font script="Bugi" typeface="Leelawadee UI"/>
+        <a:font script="Bopo" typeface="Microsoft JhengHei"/>
+        <a:font script="Java" typeface="Javanese Text"/>
+        <a:font script="Lisu" typeface="Segoe UI"/>
+        <a:font script="Mymr" typeface="Myanmar Text"/>
+        <a:font script="Nkoo" typeface="Ebrima"/>
+        <a:font script="Olck" typeface="Nirmala UI"/>
+        <a:font script="Osma" typeface="Ebrima"/>
+        <a:font script="Phag" typeface="Phagspa"/>
+        <a:font script="Syrn" typeface="Estrangelo Edessa"/>
+        <a:font script="Syrj" typeface="Estrangelo Edessa"/>
+        <a:font script="Syre" typeface="Estrangelo Edessa"/>
+        <a:font script="Sora" typeface="Nirmala UI"/>
+        <a:font script="Tale" typeface="Microsoft Tai Le"/>
+        <a:font script="Talu" typeface="Microsoft New Tai Lue"/>
+        <a:font script="Tfng" typeface="Ebrima"/>
+      </a:majorFont>
+      <a:minorFont>
+        <a:latin typeface="Calibri" panose="020F0502020204030204"/>
+        <a:ea typeface=""/>
+        <a:cs typeface=""/>
+        <a:font script="Jpan" typeface="游ゴシック"/>
+        <a:font script="Hang" typeface="맑은 고딕"/>
+        <a:font script="Hans" typeface="等线"/>
+        <a:font script="Hant" typeface="新細明體"/>
+        <a:font script="Arab" typeface="Arial"/>
+        <a:font script="Hebr" typeface="Arial"/>
+        <a:font script="Thai" typeface="Cordia New"/>
+        <a:font script="Ethi" typeface="Nyala"/>
+        <a:font script="Beng" typeface="Vrinda"/>
+        <a:font script="Gujr" typeface="Shruti"/>
+        <a:font script="Khmr" typeface="DaunPenh"/>
+        <a:font script="Knda" typeface="Tunga"/>
+        <a:font script="Guru" typeface="Raavi"/>
+        <a:font script="Cans" typeface="Euphemia"/>
+        <a:font script="Cher" typeface="Plantagenet Cherokee"/>
+        <a:font script="Yiii" typeface="Microsoft Yi Baiti"/>
+        <a:font script="Tibt" typeface="Microsoft Himalaya"/>
+        <a:font script="Thaa" typeface="MV Boli"/>
+        <a:font script="Deva" typeface="Mangal"/>
+        <a:font script="Telu" typeface="Gautami"/>
+        <a:font script="Taml" typeface="Latha"/>
+        <a:font script="Syrc" typeface="Estrangelo Edessa"/>
+        <a:font script="Orya" typeface="Kalinga"/>
+        <a:font script="Mlym" typeface="Kartika"/>
+        <a:font script="Laoo" typeface="DokChampa"/>
+        <a:font script="Sinh" typeface="Iskoola Pota"/>
+        <a:font script="Mong" typeface="Mongolian Baiti"/>
+        <a:font script="Viet" typeface="Arial"/>
+        <a:font script="Uigh" typeface="Microsoft Uighur"/>
+        <a:font script="Geor" typeface="Sylfaen"/>
+        <a:font script="Armn" typeface="Arial"/>
+        <a:font script="Bugi" typeface="Leelawadee UI"/>
+        <a:font script="Bopo" typeface="Microsoft JhengHei"/>
+        <a:font script="Java" typeface="Javanese Text"/>
+        <a:font script="Lisu" typeface="Segoe UI"/>
+        <a:font script="Mymr" typeface="Myanmar Text"/>
+        <a:font script="Nkoo" typeface="Ebrima"/>
+        <a:font script="Olck" typeface="Nirmala UI"/>
+        <a:font script="Osma" typeface="Ebrima"/>
+        <a:font script="Phag" typeface="Phagspa"/>
+        <a:font script="Syrn" typeface="Estrangelo Edessa"/>
+        <a:font script="Syrj" typeface="Estrangelo Edessa"/>
+        <a:font script="Syre" typeface="Estrangelo Edessa"/>
+        <a:font script="Sora" typeface="Nirmala UI"/>
+        <a:font script="Tale" typeface="Microsoft Tai Le"/>
+        <a:font script="Talu" typeface="Microsoft New Tai Lue"/>
+        <a:font script="Tfng" typeface="Ebrima"/>
+      </a:minorFont>
+    </a:fontScheme>
+    <a:fmtScheme name="Office">
+      <a:fillStyleLst>
+        <a:solidFill>
+          <a:schemeClr val="phClr"/>
+        </a:solidFill>
+        <a:gradFill rotWithShape="1">
+          <a:gsLst>
+            <a:gs pos="0">
+              <a:schemeClr val="phClr">
+                <a:lumMod val="110000"/>
+                <a:satMod val="105000"/>
+                <a:tint val="67000"/>
+              </a:schemeClr>
+            </a:gs>
+            <a:gs pos="50000">
+              <a:schemeClr val="phClr">
+                <a:lumMod val="105000"/>
+                <a:satMod val="103000"/>
+                <a:tint val="73000"/>
+              </a:schemeClr>
+            </a:gs>
+            <a:gs pos="100000">
+              <a:schemeClr val="phClr">
+                <a:lumMod val="105000"/>
+                <a:satMod val="109000"/>
+                <a:tint val="81000"/>
+              </a:schemeClr>
+            </a:gs>
+          </a:gsLst>
+          <a:lin ang="5400000" scaled="0"/>
+        </a:gradFill>
+        <a:gradFill rotWithShape="1">
+          <a:gsLst>
+            <a:gs pos="0">
+              <a:schemeClr val="phClr">
+                <a:satMod val="103000"/>
+                <a:lumMod val="102000"/>
+                <a:tint val="94000"/>
+              </a:schemeClr>
+            </a:gs>
+            <a:gs pos="50000">
+              <a:schemeClr val="phClr">
+                <a:satMod val="110000"/>
+                <a:lumMod val="100000"/>
+                <a:shade val="100000"/>
+              </a:schemeClr>
+            </a:gs>
+            <a:gs pos="100000">
+              <a:schemeClr val="phClr">
+                <a:lumMod val="99000"/>
+                <a:satMod val="120000"/>
+                <a:shade val="78000"/>
+              </a:schemeClr>
+            </a:gs>
+          </a:gsLst>
+          <a:lin ang="5400000" scaled="0"/>
+        </a:gradFill>
+      </a:fillStyleLst>
+      <a:lnStyleLst>
+        <a:ln w="6350" cap="flat" cmpd="sng" algn="ctr">
+          <a:solidFill>
+            <a:schemeClr val="phClr"/>
+          </a:solidFill>
+          <a:prstDash val="solid"/>
+          <a:miter lim="800000"/>
+        </a:ln>
+        <a:ln w="12700" cap="flat" cmpd="sng" algn="ctr">
+          <a:solidFill>
+            <a:schemeClr val="phClr"/>
+          </a:solidFill>
+          <a:prstDash val="solid"/>
+          <a:miter lim="800000"/>
+        </a:ln>
+        <a:ln w="19050" cap="flat" cmpd="sng" algn="ctr">
+          <a:solidFill>
+            <a:schemeClr val="phClr"/>
+          </a:solidFill>
+          <a:prstDash val="solid"/>
+          <a:miter lim="800000"/>
+        </a:ln>
+      </a:lnStyleLst>
+      <a:effectStyleLst>
+        <a:effectStyle>
+          <a:effectLst/>
+        </a:effectStyle>
+        <a:effectStyle>
+          <a:effectLst/>
+        </a:effectStyle>
+        <a:effectStyle>
+          <a:effectLst>
+            <a:outerShdw blurRad="57150" dist="19050" dir="5400000" algn="ctr" rotWithShape="0">
+              <a:srgbClr val="000000">
+                <a:alpha val="63000"/>
+              </a:srgbClr>
+            </a:outerShdw>
+          </a:effectLst>
+        </a:effectStyle>
+      </a:effectStyleLst>
+      <a:bgFillStyleLst>
+        <a:solidFill>
+          <a:schemeClr val="phClr"/>
+        </a:solidFill>
+        <a:solidFill>
+          <a:schemeClr val="phClr">
+            <a:tint val="95000"/>
+            <a:satMod val="170000"/>
+          </a:schemeClr>
+        </a:solidFill>
+        <a:gradFill rotWithShape="1">
+          <a:gsLst>
+            <a:gs pos="0">
+              <a:schemeClr val="phClr">
+                <a:tint val="93000"/>
+                <a:satMod val="150000"/>
+                <a:shade val="98000"/>
+                <a:lumMod val="102000"/>
+              </a:schemeClr>
+            </a:gs>
+            <a:gs pos="50000">
+              <a:schemeClr val="phClr">
+                <a:tint val="98000"/>
+                <a:satMod val="130000"/>
+                <a:shade val="90000"/>
+                <a:lumMod val="103000"/>
+              </a:schemeClr>
+            </a:gs>
+            <a:gs pos="100000">
+              <a:schemeClr val="phClr">
+                <a:shade val="63000"/>
+                <a:satMod val="120000"/>
+              </a:schemeClr>
+            </a:gs>
+          </a:gsLst>
+          <a:lin ang="5400000" scaled="0"/>
+        </a:gradFill>
+      </a:bgFillStyleLst>
+    </a:fmtScheme>
+  </a:themeElements>
+  <a:objectDefaults/>
+  <a:extraClrSchemeLst/>
+  <a:extLst>
+    <a:ext uri="{05A4C25C-085E-4340-85A3-A5531E510DB2}">
+      <thm15:themeFamily xmlns:thm15="http://schemas.microsoft.com/office/thememl/2012/main" name="Office Theme" id="{62F939B6-93AF-4DB8-9C6B-D6C7DFDC589F}" vid="{4A3C46E8-61CC-4603-A589-7422A47A8E4A}"/>
+    </a:ext>
+  </a:extLst>
+</a:theme>
 </file>
</xml_diff>